<commit_message>
added the notes to some pages under notes section
</commit_message>
<xml_diff>
--- a/Progress.pptx
+++ b/Progress.pptx
@@ -22,20 +22,13 @@
   <p:notesSz cx="6858000" cy="9144000"/>
   <p:embeddedFontLst>
     <p:embeddedFont>
-      <p:font typeface="Calibri" panose="020F0502020204030204" pitchFamily="34" charset="0"/>
+      <p:font typeface="Cambria Math" panose="02040503050406030204" pitchFamily="18" charset="0"/>
       <p:regular r:id="rId12"/>
-      <p:bold r:id="rId13"/>
-      <p:italic r:id="rId14"/>
-      <p:boldItalic r:id="rId15"/>
     </p:embeddedFont>
     <p:embeddedFont>
-      <p:font typeface="Cambria Math" panose="02040503050406030204" pitchFamily="18" charset="0"/>
-      <p:regular r:id="rId16"/>
-    </p:embeddedFont>
-    <p:embeddedFont>
-      <p:font typeface="Noto Sans Symbols" pitchFamily="2" charset="0"/>
-      <p:regular r:id="rId17"/>
-      <p:bold r:id="rId18"/>
+      <p:font typeface="Noto Sans Symbols" panose="020B0604020202020204" charset="0"/>
+      <p:regular r:id="rId13"/>
+      <p:bold r:id="rId14"/>
     </p:embeddedFont>
   </p:embeddedFontLst>
   <p:defaultTextStyle>
@@ -1681,7 +1674,637 @@
               </a:spcAft>
               <a:buNone/>
             </a:pPr>
-            <a:endParaRPr dirty="0"/>
+            <a:r>
+              <a:rPr lang="tr-TR" dirty="0" err="1"/>
+              <a:t>Our</a:t>
+            </a:r>
+            <a:r>
+              <a:rPr lang="tr-TR" dirty="0"/>
+              <a:t> Project is </a:t>
+            </a:r>
+            <a:r>
+              <a:rPr lang="tr-TR" dirty="0" err="1"/>
+              <a:t>the</a:t>
+            </a:r>
+            <a:r>
+              <a:rPr lang="tr-TR" dirty="0"/>
+              <a:t> </a:t>
+            </a:r>
+            <a:r>
+              <a:rPr lang="tr-TR" dirty="0" err="1"/>
+              <a:t>controlling</a:t>
+            </a:r>
+            <a:r>
+              <a:rPr lang="tr-TR" dirty="0"/>
+              <a:t> of </a:t>
+            </a:r>
+            <a:r>
+              <a:rPr lang="tr-TR" dirty="0" err="1"/>
+              <a:t>quadcopter</a:t>
+            </a:r>
+            <a:r>
+              <a:rPr lang="tr-TR" dirty="0"/>
+              <a:t> </a:t>
+            </a:r>
+            <a:r>
+              <a:rPr lang="tr-TR" dirty="0" err="1"/>
+              <a:t>angles</a:t>
+            </a:r>
+            <a:r>
+              <a:rPr lang="tr-TR" dirty="0"/>
+              <a:t> </a:t>
+            </a:r>
+            <a:r>
+              <a:rPr lang="tr-TR" dirty="0" err="1"/>
+              <a:t>with</a:t>
+            </a:r>
+            <a:r>
+              <a:rPr lang="tr-TR" dirty="0"/>
+              <a:t> RL </a:t>
+            </a:r>
+            <a:r>
+              <a:rPr lang="tr-TR" dirty="0" err="1"/>
+              <a:t>agent</a:t>
+            </a:r>
+            <a:r>
+              <a:rPr lang="tr-TR" dirty="0"/>
+              <a:t> </a:t>
+            </a:r>
+            <a:r>
+              <a:rPr lang="tr-TR" dirty="0" err="1"/>
+              <a:t>instead</a:t>
+            </a:r>
+            <a:r>
+              <a:rPr lang="tr-TR" dirty="0"/>
+              <a:t> of PID </a:t>
+            </a:r>
+            <a:r>
+              <a:rPr lang="tr-TR" dirty="0" err="1"/>
+              <a:t>controller</a:t>
+            </a:r>
+            <a:r>
+              <a:rPr lang="tr-TR" dirty="0"/>
+              <a:t>.</a:t>
+            </a:r>
+          </a:p>
+          <a:p>
+            <a:pPr marL="0" lvl="0" indent="0" algn="l" rtl="0">
+              <a:spcBef>
+                <a:spcPts val="0"/>
+              </a:spcBef>
+              <a:spcAft>
+                <a:spcPts val="0"/>
+              </a:spcAft>
+              <a:buNone/>
+            </a:pPr>
+            <a:r>
+              <a:rPr lang="tr-TR" dirty="0" err="1"/>
+              <a:t>Becasue</a:t>
+            </a:r>
+            <a:r>
+              <a:rPr lang="tr-TR" dirty="0"/>
+              <a:t> PID </a:t>
+            </a:r>
+            <a:r>
+              <a:rPr lang="tr-TR" dirty="0" err="1"/>
+              <a:t>system</a:t>
+            </a:r>
+            <a:r>
+              <a:rPr lang="tr-TR" dirty="0"/>
+              <a:t> is not </a:t>
+            </a:r>
+            <a:r>
+              <a:rPr lang="tr-TR" dirty="0" err="1"/>
+              <a:t>stable</a:t>
+            </a:r>
+            <a:r>
+              <a:rPr lang="tr-TR" dirty="0"/>
+              <a:t> </a:t>
+            </a:r>
+            <a:r>
+              <a:rPr lang="tr-TR" dirty="0" err="1"/>
+              <a:t>for</a:t>
+            </a:r>
+            <a:r>
+              <a:rPr lang="tr-TR" dirty="0"/>
+              <a:t> </a:t>
+            </a:r>
+            <a:r>
+              <a:rPr lang="tr-TR" dirty="0" err="1"/>
+              <a:t>unknown</a:t>
+            </a:r>
+            <a:r>
+              <a:rPr lang="tr-TR" dirty="0"/>
+              <a:t> </a:t>
+            </a:r>
+            <a:r>
+              <a:rPr lang="tr-TR" dirty="0" err="1"/>
+              <a:t>environment</a:t>
+            </a:r>
+            <a:r>
+              <a:rPr lang="tr-TR" dirty="0"/>
+              <a:t>.</a:t>
+            </a:r>
+          </a:p>
+          <a:p>
+            <a:pPr marL="0" lvl="0" indent="0" algn="l" rtl="0">
+              <a:spcBef>
+                <a:spcPts val="0"/>
+              </a:spcBef>
+              <a:spcAft>
+                <a:spcPts val="0"/>
+              </a:spcAft>
+              <a:buNone/>
+            </a:pPr>
+            <a:r>
+              <a:rPr lang="tr-TR" dirty="0" err="1"/>
+              <a:t>We</a:t>
+            </a:r>
+            <a:r>
+              <a:rPr lang="tr-TR" dirty="0"/>
+              <a:t> </a:t>
+            </a:r>
+            <a:r>
+              <a:rPr lang="tr-TR" dirty="0" err="1"/>
+              <a:t>planned</a:t>
+            </a:r>
+            <a:r>
+              <a:rPr lang="tr-TR" dirty="0"/>
+              <a:t> </a:t>
+            </a:r>
+            <a:r>
+              <a:rPr lang="tr-TR" dirty="0" err="1"/>
+              <a:t>to</a:t>
+            </a:r>
+            <a:r>
+              <a:rPr lang="tr-TR" dirty="0"/>
+              <a:t> </a:t>
+            </a:r>
+            <a:r>
+              <a:rPr lang="tr-TR" dirty="0" err="1"/>
+              <a:t>use</a:t>
+            </a:r>
+            <a:r>
+              <a:rPr lang="tr-TR" dirty="0"/>
+              <a:t> </a:t>
+            </a:r>
+            <a:r>
+              <a:rPr lang="tr-TR" dirty="0" err="1"/>
+              <a:t>the</a:t>
+            </a:r>
+            <a:r>
+              <a:rPr lang="tr-TR" dirty="0"/>
+              <a:t> DDPG </a:t>
+            </a:r>
+            <a:r>
+              <a:rPr lang="tr-TR" dirty="0" err="1"/>
+              <a:t>and</a:t>
+            </a:r>
+            <a:r>
+              <a:rPr lang="tr-TR" dirty="0"/>
+              <a:t> PPO </a:t>
+            </a:r>
+            <a:r>
+              <a:rPr lang="tr-TR" dirty="0" err="1"/>
+              <a:t>agents</a:t>
+            </a:r>
+            <a:r>
+              <a:rPr lang="tr-TR" dirty="0"/>
+              <a:t> </a:t>
+            </a:r>
+            <a:r>
+              <a:rPr lang="tr-TR" dirty="0" err="1"/>
+              <a:t>for</a:t>
+            </a:r>
+            <a:r>
+              <a:rPr lang="tr-TR" dirty="0"/>
+              <a:t> </a:t>
+            </a:r>
+            <a:r>
+              <a:rPr lang="tr-TR" dirty="0" err="1"/>
+              <a:t>xy</a:t>
+            </a:r>
+            <a:r>
+              <a:rPr lang="tr-TR" dirty="0"/>
+              <a:t> </a:t>
+            </a:r>
+            <a:r>
+              <a:rPr lang="tr-TR" dirty="0" err="1"/>
+              <a:t>controller</a:t>
+            </a:r>
+            <a:r>
+              <a:rPr lang="tr-TR" dirty="0"/>
+              <a:t> </a:t>
+            </a:r>
+            <a:r>
+              <a:rPr lang="tr-TR" dirty="0" err="1"/>
+              <a:t>and</a:t>
+            </a:r>
+            <a:r>
+              <a:rPr lang="tr-TR" dirty="0"/>
+              <a:t> z </a:t>
+            </a:r>
+            <a:r>
+              <a:rPr lang="tr-TR" dirty="0" err="1"/>
+              <a:t>controller</a:t>
+            </a:r>
+            <a:r>
+              <a:rPr lang="tr-TR" dirty="0"/>
+              <a:t>.</a:t>
+            </a:r>
+          </a:p>
+          <a:p>
+            <a:pPr marL="0" lvl="0" indent="0" algn="l" rtl="0">
+              <a:spcBef>
+                <a:spcPts val="0"/>
+              </a:spcBef>
+              <a:spcAft>
+                <a:spcPts val="0"/>
+              </a:spcAft>
+              <a:buNone/>
+            </a:pPr>
+            <a:r>
+              <a:rPr lang="tr-TR" dirty="0" err="1"/>
+              <a:t>Why</a:t>
+            </a:r>
+            <a:r>
+              <a:rPr lang="tr-TR" dirty="0"/>
+              <a:t> </a:t>
+            </a:r>
+            <a:r>
+              <a:rPr lang="tr-TR" dirty="0" err="1"/>
+              <a:t>we</a:t>
+            </a:r>
+            <a:r>
+              <a:rPr lang="tr-TR" dirty="0"/>
+              <a:t> </a:t>
+            </a:r>
+            <a:r>
+              <a:rPr lang="tr-TR" dirty="0" err="1"/>
+              <a:t>chose</a:t>
+            </a:r>
+            <a:r>
+              <a:rPr lang="tr-TR" dirty="0"/>
+              <a:t> </a:t>
+            </a:r>
+            <a:r>
+              <a:rPr lang="tr-TR" dirty="0" err="1"/>
+              <a:t>these</a:t>
+            </a:r>
+            <a:r>
+              <a:rPr lang="tr-TR" dirty="0"/>
+              <a:t> </a:t>
+            </a:r>
+            <a:r>
+              <a:rPr lang="tr-TR" dirty="0" err="1"/>
+              <a:t>two</a:t>
+            </a:r>
+            <a:r>
+              <a:rPr lang="tr-TR" dirty="0"/>
+              <a:t> </a:t>
+            </a:r>
+            <a:r>
+              <a:rPr lang="tr-TR" dirty="0" err="1"/>
+              <a:t>agents</a:t>
+            </a:r>
+            <a:r>
+              <a:rPr lang="tr-TR" dirty="0"/>
+              <a:t> ? </a:t>
+            </a:r>
+          </a:p>
+          <a:p>
+            <a:pPr marL="0" lvl="0" indent="0" algn="l" rtl="0">
+              <a:spcBef>
+                <a:spcPts val="0"/>
+              </a:spcBef>
+              <a:spcAft>
+                <a:spcPts val="0"/>
+              </a:spcAft>
+              <a:buNone/>
+            </a:pPr>
+            <a:r>
+              <a:rPr lang="tr-TR" dirty="0" err="1"/>
+              <a:t>Before</a:t>
+            </a:r>
+            <a:r>
+              <a:rPr lang="tr-TR" dirty="0"/>
+              <a:t> </a:t>
+            </a:r>
+            <a:r>
+              <a:rPr lang="tr-TR" dirty="0" err="1"/>
+              <a:t>the</a:t>
+            </a:r>
+            <a:r>
+              <a:rPr lang="tr-TR" dirty="0"/>
+              <a:t> Project </a:t>
+            </a:r>
+            <a:r>
+              <a:rPr lang="tr-TR" dirty="0" err="1"/>
+              <a:t>proposal</a:t>
+            </a:r>
+            <a:r>
+              <a:rPr lang="tr-TR" dirty="0"/>
+              <a:t> </a:t>
+            </a:r>
+            <a:r>
+              <a:rPr lang="tr-TR" dirty="0" err="1"/>
+              <a:t>presentation</a:t>
+            </a:r>
+            <a:r>
+              <a:rPr lang="tr-TR" dirty="0"/>
+              <a:t> </a:t>
+            </a:r>
+            <a:r>
+              <a:rPr lang="tr-TR" dirty="0" err="1"/>
+              <a:t>we</a:t>
+            </a:r>
+            <a:r>
+              <a:rPr lang="tr-TR" dirty="0"/>
+              <a:t> </a:t>
+            </a:r>
+            <a:r>
+              <a:rPr lang="tr-TR" dirty="0" err="1"/>
+              <a:t>searched</a:t>
+            </a:r>
+            <a:r>
+              <a:rPr lang="tr-TR" dirty="0"/>
+              <a:t> </a:t>
+            </a:r>
+            <a:r>
+              <a:rPr lang="tr-TR" dirty="0" err="1"/>
+              <a:t>related</a:t>
+            </a:r>
+            <a:r>
+              <a:rPr lang="tr-TR" dirty="0"/>
+              <a:t> </a:t>
+            </a:r>
+            <a:r>
+              <a:rPr lang="tr-TR" dirty="0" err="1"/>
+              <a:t>literatures</a:t>
+            </a:r>
+            <a:r>
+              <a:rPr lang="tr-TR" dirty="0"/>
+              <a:t> </a:t>
+            </a:r>
+            <a:r>
+              <a:rPr lang="tr-TR" dirty="0" err="1"/>
+              <a:t>and</a:t>
+            </a:r>
+            <a:r>
+              <a:rPr lang="tr-TR" dirty="0"/>
+              <a:t> </a:t>
+            </a:r>
+            <a:r>
+              <a:rPr lang="tr-TR" dirty="0" err="1"/>
+              <a:t>noticed</a:t>
+            </a:r>
+            <a:r>
+              <a:rPr lang="tr-TR" dirty="0"/>
+              <a:t> </a:t>
+            </a:r>
+            <a:r>
+              <a:rPr lang="tr-TR" dirty="0" err="1"/>
+              <a:t>these</a:t>
+            </a:r>
+            <a:r>
+              <a:rPr lang="tr-TR" dirty="0"/>
+              <a:t> </a:t>
+            </a:r>
+            <a:r>
+              <a:rPr lang="tr-TR" dirty="0" err="1"/>
+              <a:t>two</a:t>
+            </a:r>
+            <a:r>
+              <a:rPr lang="tr-TR" dirty="0"/>
+              <a:t> </a:t>
+            </a:r>
+            <a:r>
+              <a:rPr lang="tr-TR" dirty="0" err="1"/>
+              <a:t>agent</a:t>
+            </a:r>
+            <a:r>
+              <a:rPr lang="tr-TR" dirty="0"/>
+              <a:t> </a:t>
+            </a:r>
+            <a:r>
+              <a:rPr lang="tr-TR" dirty="0" err="1"/>
+              <a:t>performance</a:t>
+            </a:r>
+            <a:r>
+              <a:rPr lang="tr-TR" dirty="0"/>
+              <a:t> is </a:t>
+            </a:r>
+            <a:r>
+              <a:rPr lang="tr-TR" dirty="0" err="1"/>
+              <a:t>better</a:t>
+            </a:r>
+            <a:r>
+              <a:rPr lang="tr-TR" dirty="0"/>
+              <a:t> </a:t>
+            </a:r>
+            <a:r>
+              <a:rPr lang="tr-TR" dirty="0" err="1"/>
+              <a:t>than</a:t>
+            </a:r>
+            <a:r>
+              <a:rPr lang="tr-TR" dirty="0"/>
+              <a:t> </a:t>
+            </a:r>
+            <a:r>
+              <a:rPr lang="tr-TR" dirty="0" err="1"/>
+              <a:t>other</a:t>
+            </a:r>
+            <a:r>
+              <a:rPr lang="tr-TR" dirty="0"/>
+              <a:t> </a:t>
+            </a:r>
+            <a:r>
+              <a:rPr lang="tr-TR" dirty="0" err="1"/>
+              <a:t>agents</a:t>
+            </a:r>
+            <a:r>
+              <a:rPr lang="tr-TR" dirty="0"/>
+              <a:t>. </a:t>
+            </a:r>
+            <a:r>
+              <a:rPr lang="tr-TR" dirty="0" err="1"/>
+              <a:t>Therefore</a:t>
+            </a:r>
+            <a:r>
+              <a:rPr lang="tr-TR" dirty="0"/>
+              <a:t> </a:t>
+            </a:r>
+            <a:r>
+              <a:rPr lang="tr-TR" dirty="0" err="1"/>
+              <a:t>we</a:t>
+            </a:r>
+            <a:r>
+              <a:rPr lang="tr-TR" dirty="0"/>
+              <a:t> </a:t>
+            </a:r>
+            <a:r>
+              <a:rPr lang="tr-TR" dirty="0" err="1"/>
+              <a:t>focused</a:t>
+            </a:r>
+            <a:r>
+              <a:rPr lang="tr-TR" dirty="0"/>
+              <a:t> </a:t>
+            </a:r>
+            <a:r>
+              <a:rPr lang="tr-TR" dirty="0" err="1"/>
+              <a:t>these</a:t>
+            </a:r>
+            <a:r>
+              <a:rPr lang="tr-TR" dirty="0"/>
+              <a:t>.</a:t>
+            </a:r>
+          </a:p>
+          <a:p>
+            <a:pPr marL="0" lvl="0" indent="0" algn="l" rtl="0">
+              <a:spcBef>
+                <a:spcPts val="0"/>
+              </a:spcBef>
+              <a:spcAft>
+                <a:spcPts val="0"/>
+              </a:spcAft>
+              <a:buNone/>
+            </a:pPr>
+            <a:r>
+              <a:rPr lang="tr-TR" dirty="0" err="1"/>
+              <a:t>We</a:t>
+            </a:r>
+            <a:r>
+              <a:rPr lang="tr-TR" dirty="0"/>
+              <a:t> </a:t>
+            </a:r>
+            <a:r>
+              <a:rPr lang="tr-TR" dirty="0" err="1"/>
+              <a:t>are</a:t>
+            </a:r>
+            <a:r>
+              <a:rPr lang="tr-TR" dirty="0"/>
+              <a:t> </a:t>
+            </a:r>
+            <a:r>
+              <a:rPr lang="tr-TR" dirty="0" err="1"/>
+              <a:t>planning</a:t>
+            </a:r>
+            <a:r>
+              <a:rPr lang="tr-TR" dirty="0"/>
+              <a:t> </a:t>
+            </a:r>
+            <a:r>
+              <a:rPr lang="tr-TR" dirty="0" err="1"/>
+              <a:t>to</a:t>
+            </a:r>
+            <a:r>
+              <a:rPr lang="tr-TR" dirty="0"/>
+              <a:t> </a:t>
+            </a:r>
+            <a:r>
+              <a:rPr lang="tr-TR" dirty="0" err="1"/>
+              <a:t>new</a:t>
+            </a:r>
+            <a:r>
+              <a:rPr lang="tr-TR" dirty="0"/>
+              <a:t> </a:t>
+            </a:r>
+            <a:r>
+              <a:rPr lang="tr-TR" dirty="0" err="1"/>
+              <a:t>reward</a:t>
+            </a:r>
+            <a:r>
+              <a:rPr lang="tr-TR" dirty="0"/>
+              <a:t> </a:t>
+            </a:r>
+            <a:r>
+              <a:rPr lang="tr-TR" dirty="0" err="1"/>
+              <a:t>function</a:t>
+            </a:r>
+            <a:r>
+              <a:rPr lang="tr-TR" dirty="0"/>
+              <a:t> </a:t>
+            </a:r>
+            <a:r>
+              <a:rPr lang="tr-TR" dirty="0" err="1"/>
+              <a:t>that</a:t>
+            </a:r>
+            <a:r>
+              <a:rPr lang="tr-TR" dirty="0"/>
+              <a:t> is </a:t>
+            </a:r>
+            <a:r>
+              <a:rPr lang="tr-TR" dirty="0" err="1"/>
+              <a:t>unlike</a:t>
+            </a:r>
+            <a:r>
+              <a:rPr lang="tr-TR" dirty="0"/>
+              <a:t> </a:t>
+            </a:r>
+            <a:r>
+              <a:rPr lang="tr-TR" dirty="0" err="1"/>
+              <a:t>the</a:t>
+            </a:r>
+            <a:r>
+              <a:rPr lang="tr-TR" dirty="0"/>
+              <a:t> literatüre </a:t>
+            </a:r>
+            <a:r>
+              <a:rPr lang="tr-TR" dirty="0" err="1"/>
+              <a:t>ones</a:t>
+            </a:r>
+            <a:r>
+              <a:rPr lang="tr-TR" dirty="0"/>
+              <a:t> </a:t>
+            </a:r>
+            <a:r>
+              <a:rPr lang="tr-TR" dirty="0" err="1"/>
+              <a:t>to</a:t>
+            </a:r>
+            <a:r>
+              <a:rPr lang="tr-TR" dirty="0"/>
+              <a:t> </a:t>
+            </a:r>
+            <a:r>
+              <a:rPr lang="tr-TR" dirty="0" err="1"/>
+              <a:t>find</a:t>
+            </a:r>
+            <a:r>
+              <a:rPr lang="tr-TR" dirty="0"/>
+              <a:t> an </a:t>
+            </a:r>
+            <a:r>
+              <a:rPr lang="tr-TR" dirty="0" err="1"/>
+              <a:t>better</a:t>
+            </a:r>
+            <a:r>
+              <a:rPr lang="tr-TR" dirty="0"/>
+              <a:t> </a:t>
+            </a:r>
+            <a:r>
+              <a:rPr lang="tr-TR" dirty="0" err="1"/>
+              <a:t>performance</a:t>
+            </a:r>
+            <a:r>
+              <a:rPr lang="tr-TR" dirty="0"/>
+              <a:t>, </a:t>
+            </a:r>
+            <a:r>
+              <a:rPr lang="tr-TR" dirty="0" err="1"/>
+              <a:t>if</a:t>
+            </a:r>
+            <a:r>
+              <a:rPr lang="tr-TR" dirty="0"/>
+              <a:t> </a:t>
+            </a:r>
+            <a:r>
+              <a:rPr lang="tr-TR" dirty="0" err="1"/>
+              <a:t>posiible</a:t>
+            </a:r>
+            <a:r>
+              <a:rPr lang="tr-TR" dirty="0"/>
+              <a:t>.</a:t>
+            </a:r>
           </a:p>
         </p:txBody>
       </p:sp>
@@ -1850,7 +2473,228 @@
               </a:spcAft>
               <a:buNone/>
             </a:pPr>
-            <a:endParaRPr dirty="0"/>
+            <a:r>
+              <a:rPr lang="tr-TR" dirty="0" err="1"/>
+              <a:t>This</a:t>
+            </a:r>
+            <a:r>
+              <a:rPr lang="tr-TR" dirty="0"/>
+              <a:t> is </a:t>
+            </a:r>
+            <a:r>
+              <a:rPr lang="tr-TR" dirty="0" err="1"/>
+              <a:t>the</a:t>
+            </a:r>
+            <a:r>
+              <a:rPr lang="tr-TR" dirty="0"/>
+              <a:t> </a:t>
+            </a:r>
+            <a:r>
+              <a:rPr lang="tr-TR" dirty="0" err="1"/>
+              <a:t>our</a:t>
+            </a:r>
+            <a:r>
+              <a:rPr lang="tr-TR" dirty="0"/>
+              <a:t> Project </a:t>
+            </a:r>
+            <a:r>
+              <a:rPr lang="tr-TR" dirty="0" err="1"/>
+              <a:t>environment</a:t>
+            </a:r>
+            <a:r>
+              <a:rPr lang="tr-TR" dirty="0"/>
+              <a:t> at </a:t>
+            </a:r>
+            <a:r>
+              <a:rPr lang="tr-TR" dirty="0" err="1"/>
+              <a:t>Simulink</a:t>
+            </a:r>
+            <a:r>
+              <a:rPr lang="tr-TR" dirty="0"/>
+              <a:t> platform. </a:t>
+            </a:r>
+            <a:r>
+              <a:rPr lang="tr-TR" dirty="0" err="1"/>
+              <a:t>Each</a:t>
+            </a:r>
+            <a:r>
+              <a:rPr lang="tr-TR" dirty="0"/>
+              <a:t> </a:t>
+            </a:r>
+            <a:r>
+              <a:rPr lang="tr-TR" dirty="0" err="1"/>
+              <a:t>block</a:t>
+            </a:r>
+            <a:r>
+              <a:rPr lang="tr-TR" dirty="0"/>
+              <a:t> </a:t>
+            </a:r>
+            <a:r>
+              <a:rPr lang="tr-TR" dirty="0" err="1"/>
+              <a:t>responsible</a:t>
+            </a:r>
+            <a:r>
+              <a:rPr lang="tr-TR" dirty="0"/>
+              <a:t> </a:t>
+            </a:r>
+            <a:r>
+              <a:rPr lang="tr-TR" dirty="0" err="1"/>
+              <a:t>for</a:t>
+            </a:r>
+            <a:r>
+              <a:rPr lang="tr-TR" dirty="0"/>
+              <a:t> </a:t>
+            </a:r>
+            <a:r>
+              <a:rPr lang="tr-TR" dirty="0" err="1"/>
+              <a:t>different</a:t>
+            </a:r>
+            <a:r>
+              <a:rPr lang="tr-TR" dirty="0"/>
+              <a:t> </a:t>
+            </a:r>
+            <a:r>
+              <a:rPr lang="tr-TR" dirty="0" err="1"/>
+              <a:t>tasks</a:t>
+            </a:r>
+            <a:r>
+              <a:rPr lang="tr-TR" dirty="0"/>
+              <a:t>. </a:t>
+            </a:r>
+          </a:p>
+          <a:p>
+            <a:pPr marL="0" lvl="0" indent="0" algn="l" rtl="0">
+              <a:spcBef>
+                <a:spcPts val="0"/>
+              </a:spcBef>
+              <a:spcAft>
+                <a:spcPts val="0"/>
+              </a:spcAft>
+              <a:buNone/>
+            </a:pPr>
+            <a:r>
+              <a:rPr lang="tr-TR" dirty="0" err="1"/>
+              <a:t>Signal</a:t>
+            </a:r>
+            <a:r>
+              <a:rPr lang="tr-TR" dirty="0"/>
+              <a:t> Editor               :  AC </a:t>
+            </a:r>
+            <a:r>
+              <a:rPr lang="tr-TR" dirty="0" err="1"/>
+              <a:t>command</a:t>
+            </a:r>
+            <a:r>
+              <a:rPr lang="tr-TR" dirty="0"/>
+              <a:t> </a:t>
+            </a:r>
+            <a:r>
+              <a:rPr lang="tr-TR" dirty="0" err="1"/>
+              <a:t>are</a:t>
+            </a:r>
+            <a:r>
+              <a:rPr lang="tr-TR" dirty="0"/>
+              <a:t> </a:t>
+            </a:r>
+            <a:r>
+              <a:rPr lang="tr-TR" dirty="0" err="1"/>
+              <a:t>creted</a:t>
+            </a:r>
+            <a:r>
+              <a:rPr lang="tr-TR" dirty="0"/>
+              <a:t> </a:t>
+            </a:r>
+          </a:p>
+          <a:p>
+            <a:pPr marL="0" lvl="0" indent="0" algn="l" rtl="0">
+              <a:spcBef>
+                <a:spcPts val="0"/>
+              </a:spcBef>
+              <a:spcAft>
+                <a:spcPts val="0"/>
+              </a:spcAft>
+              <a:buNone/>
+            </a:pPr>
+            <a:r>
+              <a:rPr lang="tr-TR" dirty="0" err="1"/>
+              <a:t>Sensors</a:t>
+            </a:r>
+            <a:r>
+              <a:rPr lang="tr-TR" dirty="0"/>
+              <a:t>                       : ……………………………….</a:t>
+            </a:r>
+          </a:p>
+          <a:p>
+            <a:pPr marL="0" lvl="0" indent="0" algn="l" rtl="0">
+              <a:spcBef>
+                <a:spcPts val="0"/>
+              </a:spcBef>
+              <a:spcAft>
+                <a:spcPts val="0"/>
+              </a:spcAft>
+              <a:buNone/>
+            </a:pPr>
+            <a:r>
+              <a:rPr lang="tr-TR" dirty="0"/>
+              <a:t>Flight Control </a:t>
+            </a:r>
+            <a:r>
+              <a:rPr lang="tr-TR" dirty="0" err="1"/>
+              <a:t>System</a:t>
+            </a:r>
+            <a:r>
+              <a:rPr lang="tr-TR" dirty="0"/>
+              <a:t> : ………………………………….</a:t>
+            </a:r>
+          </a:p>
+          <a:p>
+            <a:pPr marL="0" lvl="0" indent="0" algn="l" rtl="0">
+              <a:spcBef>
+                <a:spcPts val="0"/>
+              </a:spcBef>
+              <a:spcAft>
+                <a:spcPts val="0"/>
+              </a:spcAft>
+              <a:buNone/>
+            </a:pPr>
+            <a:r>
+              <a:rPr lang="tr-TR" dirty="0"/>
+              <a:t>Environment               : ………………………………</a:t>
+            </a:r>
+          </a:p>
+          <a:p>
+            <a:pPr marL="0" lvl="0" indent="0" algn="l" rtl="0">
+              <a:spcBef>
+                <a:spcPts val="0"/>
+              </a:spcBef>
+              <a:spcAft>
+                <a:spcPts val="0"/>
+              </a:spcAft>
+              <a:buNone/>
+            </a:pPr>
+            <a:r>
+              <a:rPr lang="tr-TR" dirty="0" err="1"/>
+              <a:t>Airframe</a:t>
+            </a:r>
+            <a:r>
+              <a:rPr lang="tr-TR" dirty="0"/>
+              <a:t>                      : ………………………………</a:t>
+            </a:r>
+          </a:p>
+          <a:p>
+            <a:pPr marL="0" lvl="0" indent="0" algn="l" rtl="0">
+              <a:spcBef>
+                <a:spcPts val="0"/>
+              </a:spcBef>
+              <a:spcAft>
+                <a:spcPts val="0"/>
+              </a:spcAft>
+              <a:buNone/>
+            </a:pPr>
+            <a:r>
+              <a:rPr lang="tr-TR" dirty="0"/>
+              <a:t>  </a:t>
+            </a:r>
           </a:p>
         </p:txBody>
       </p:sp>
@@ -2019,7 +2863,592 @@
               </a:spcAft>
               <a:buNone/>
             </a:pPr>
-            <a:endParaRPr dirty="0"/>
+            <a:r>
+              <a:rPr lang="tr-TR" dirty="0" err="1"/>
+              <a:t>This</a:t>
+            </a:r>
+            <a:r>
+              <a:rPr lang="tr-TR" dirty="0"/>
+              <a:t> is </a:t>
+            </a:r>
+            <a:r>
+              <a:rPr lang="tr-TR" dirty="0" err="1"/>
+              <a:t>the</a:t>
+            </a:r>
+            <a:r>
+              <a:rPr lang="tr-TR" dirty="0"/>
+              <a:t> </a:t>
+            </a:r>
+            <a:r>
+              <a:rPr lang="tr-TR" dirty="0" err="1"/>
+              <a:t>flight</a:t>
+            </a:r>
+            <a:r>
+              <a:rPr lang="tr-TR" dirty="0"/>
+              <a:t> </a:t>
+            </a:r>
+            <a:r>
+              <a:rPr lang="tr-TR" dirty="0" err="1"/>
+              <a:t>control</a:t>
+            </a:r>
+            <a:r>
+              <a:rPr lang="tr-TR" dirty="0"/>
+              <a:t> </a:t>
+            </a:r>
+            <a:r>
+              <a:rPr lang="tr-TR" dirty="0" err="1"/>
+              <a:t>system</a:t>
+            </a:r>
+            <a:r>
+              <a:rPr lang="tr-TR" dirty="0"/>
+              <a:t> </a:t>
+            </a:r>
+            <a:r>
+              <a:rPr lang="tr-TR" dirty="0" err="1"/>
+              <a:t>block</a:t>
+            </a:r>
+            <a:r>
+              <a:rPr lang="tr-TR" dirty="0"/>
+              <a:t> </a:t>
+            </a:r>
+            <a:r>
+              <a:rPr lang="tr-TR" dirty="0" err="1"/>
+              <a:t>that</a:t>
+            </a:r>
+            <a:r>
+              <a:rPr lang="tr-TR" dirty="0"/>
+              <a:t> </a:t>
+            </a:r>
+            <a:r>
+              <a:rPr lang="tr-TR" dirty="0" err="1"/>
+              <a:t>we</a:t>
+            </a:r>
+            <a:r>
+              <a:rPr lang="tr-TR" dirty="0"/>
+              <a:t> </a:t>
+            </a:r>
+            <a:r>
+              <a:rPr lang="tr-TR" dirty="0" err="1"/>
+              <a:t>focused</a:t>
+            </a:r>
+            <a:r>
+              <a:rPr lang="tr-TR" dirty="0"/>
+              <a:t> </a:t>
+            </a:r>
+            <a:r>
+              <a:rPr lang="tr-TR" dirty="0" err="1"/>
+              <a:t>one</a:t>
+            </a:r>
+            <a:r>
+              <a:rPr lang="tr-TR" dirty="0"/>
+              <a:t>. </a:t>
+            </a:r>
+          </a:p>
+          <a:p>
+            <a:pPr marL="0" lvl="0" indent="0" algn="l" rtl="0">
+              <a:spcBef>
+                <a:spcPts val="0"/>
+              </a:spcBef>
+              <a:spcAft>
+                <a:spcPts val="0"/>
+              </a:spcAft>
+              <a:buNone/>
+            </a:pPr>
+            <a:r>
+              <a:rPr lang="tr-TR" dirty="0" err="1"/>
+              <a:t>The</a:t>
+            </a:r>
+            <a:r>
+              <a:rPr lang="tr-TR" dirty="0"/>
+              <a:t> </a:t>
+            </a:r>
+            <a:r>
+              <a:rPr lang="tr-TR" dirty="0" err="1"/>
+              <a:t>orange</a:t>
+            </a:r>
+            <a:r>
+              <a:rPr lang="tr-TR" dirty="0"/>
+              <a:t> </a:t>
+            </a:r>
+            <a:r>
+              <a:rPr lang="tr-TR" dirty="0" err="1"/>
+              <a:t>blocks</a:t>
+            </a:r>
+            <a:r>
+              <a:rPr lang="tr-TR" dirty="0"/>
+              <a:t> </a:t>
+            </a:r>
+            <a:r>
+              <a:rPr lang="tr-TR" dirty="0" err="1"/>
+              <a:t>are</a:t>
+            </a:r>
+            <a:r>
+              <a:rPr lang="tr-TR" dirty="0"/>
+              <a:t> </a:t>
+            </a:r>
+            <a:r>
+              <a:rPr lang="tr-TR" dirty="0" err="1"/>
+              <a:t>normally</a:t>
+            </a:r>
+            <a:r>
+              <a:rPr lang="tr-TR" dirty="0"/>
+              <a:t> </a:t>
+            </a:r>
+            <a:r>
+              <a:rPr lang="tr-TR" dirty="0" err="1"/>
+              <a:t>controlled</a:t>
+            </a:r>
+            <a:r>
+              <a:rPr lang="tr-TR" dirty="0"/>
+              <a:t> </a:t>
+            </a:r>
+            <a:r>
+              <a:rPr lang="tr-TR" dirty="0" err="1"/>
+              <a:t>with</a:t>
+            </a:r>
+            <a:r>
+              <a:rPr lang="tr-TR" dirty="0"/>
+              <a:t> PID </a:t>
+            </a:r>
+            <a:r>
+              <a:rPr lang="tr-TR" dirty="0" err="1"/>
+              <a:t>controller</a:t>
+            </a:r>
+            <a:r>
+              <a:rPr lang="tr-TR" dirty="0"/>
+              <a:t>. </a:t>
+            </a:r>
+            <a:r>
+              <a:rPr lang="tr-TR" dirty="0" err="1"/>
+              <a:t>However</a:t>
+            </a:r>
+            <a:r>
+              <a:rPr lang="tr-TR" dirty="0"/>
+              <a:t>, </a:t>
+            </a:r>
+            <a:r>
+              <a:rPr lang="tr-TR" dirty="0" err="1"/>
+              <a:t>we</a:t>
+            </a:r>
+            <a:r>
+              <a:rPr lang="tr-TR" dirty="0"/>
+              <a:t> </a:t>
+            </a:r>
+            <a:r>
+              <a:rPr lang="tr-TR" dirty="0" err="1"/>
+              <a:t>added</a:t>
+            </a:r>
+            <a:r>
+              <a:rPr lang="tr-TR" dirty="0"/>
+              <a:t> inside </a:t>
+            </a:r>
+            <a:r>
+              <a:rPr lang="tr-TR" dirty="0" err="1"/>
+              <a:t>these</a:t>
+            </a:r>
+            <a:r>
+              <a:rPr lang="tr-TR" dirty="0"/>
+              <a:t> </a:t>
+            </a:r>
+            <a:r>
+              <a:rPr lang="tr-TR" dirty="0" err="1"/>
+              <a:t>blocks</a:t>
+            </a:r>
+            <a:r>
+              <a:rPr lang="tr-TR" dirty="0"/>
+              <a:t> RL </a:t>
+            </a:r>
+            <a:r>
+              <a:rPr lang="tr-TR" dirty="0" err="1"/>
+              <a:t>agents</a:t>
+            </a:r>
+            <a:r>
+              <a:rPr lang="tr-TR" dirty="0"/>
+              <a:t>. </a:t>
+            </a:r>
+          </a:p>
+          <a:p>
+            <a:pPr marL="0" lvl="0" indent="0" algn="l" rtl="0">
+              <a:spcBef>
+                <a:spcPts val="0"/>
+              </a:spcBef>
+              <a:spcAft>
+                <a:spcPts val="0"/>
+              </a:spcAft>
+              <a:buNone/>
+            </a:pPr>
+            <a:r>
+              <a:rPr lang="tr-TR" dirty="0" err="1"/>
+              <a:t>Our</a:t>
+            </a:r>
+            <a:r>
+              <a:rPr lang="tr-TR" dirty="0"/>
+              <a:t> plan </a:t>
+            </a:r>
+            <a:r>
+              <a:rPr lang="tr-TR" dirty="0" err="1"/>
+              <a:t>was</a:t>
+            </a:r>
+            <a:r>
+              <a:rPr lang="tr-TR" dirty="0"/>
+              <a:t> </a:t>
+            </a:r>
+            <a:r>
+              <a:rPr lang="tr-TR" dirty="0" err="1"/>
+              <a:t>firstly</a:t>
+            </a:r>
+            <a:r>
+              <a:rPr lang="tr-TR" dirty="0"/>
+              <a:t> </a:t>
+            </a:r>
+            <a:r>
+              <a:rPr lang="tr-TR" dirty="0" err="1"/>
+              <a:t>run</a:t>
+            </a:r>
+            <a:r>
+              <a:rPr lang="tr-TR" dirty="0"/>
+              <a:t> </a:t>
+            </a:r>
+            <a:r>
+              <a:rPr lang="tr-TR" dirty="0" err="1"/>
+              <a:t>the</a:t>
+            </a:r>
+            <a:r>
+              <a:rPr lang="tr-TR" dirty="0"/>
+              <a:t> </a:t>
+            </a:r>
+            <a:r>
+              <a:rPr lang="tr-TR" dirty="0" err="1"/>
+              <a:t>environment</a:t>
+            </a:r>
+            <a:r>
+              <a:rPr lang="tr-TR" dirty="0"/>
+              <a:t> </a:t>
+            </a:r>
+            <a:r>
+              <a:rPr lang="tr-TR" dirty="0" err="1"/>
+              <a:t>with</a:t>
+            </a:r>
+            <a:r>
+              <a:rPr lang="tr-TR" dirty="0"/>
+              <a:t> PID </a:t>
+            </a:r>
+            <a:r>
+              <a:rPr lang="tr-TR" dirty="0" err="1"/>
+              <a:t>controling</a:t>
+            </a:r>
+            <a:r>
+              <a:rPr lang="tr-TR" dirty="0"/>
+              <a:t> </a:t>
+            </a:r>
+            <a:r>
+              <a:rPr lang="tr-TR" dirty="0" err="1"/>
+              <a:t>blocks</a:t>
+            </a:r>
+            <a:r>
+              <a:rPr lang="tr-TR" dirty="0"/>
+              <a:t>. </a:t>
+            </a:r>
+            <a:r>
+              <a:rPr lang="tr-TR" dirty="0" err="1"/>
+              <a:t>And</a:t>
+            </a:r>
+            <a:r>
+              <a:rPr lang="tr-TR" dirty="0"/>
+              <a:t> </a:t>
+            </a:r>
+            <a:r>
+              <a:rPr lang="tr-TR" dirty="0" err="1"/>
+              <a:t>this</a:t>
+            </a:r>
+            <a:r>
+              <a:rPr lang="tr-TR" dirty="0"/>
+              <a:t> </a:t>
+            </a:r>
+            <a:r>
+              <a:rPr lang="tr-TR" dirty="0" err="1"/>
+              <a:t>worked</a:t>
+            </a:r>
+            <a:r>
+              <a:rPr lang="tr-TR" dirty="0"/>
+              <a:t> </a:t>
+            </a:r>
+            <a:r>
+              <a:rPr lang="tr-TR" dirty="0" err="1"/>
+              <a:t>fine</a:t>
+            </a:r>
+            <a:endParaRPr lang="tr-TR" dirty="0"/>
+          </a:p>
+          <a:p>
+            <a:pPr marL="0" lvl="0" indent="0" algn="l" rtl="0">
+              <a:spcBef>
+                <a:spcPts val="0"/>
+              </a:spcBef>
+              <a:spcAft>
+                <a:spcPts val="0"/>
+              </a:spcAft>
+              <a:buNone/>
+            </a:pPr>
+            <a:r>
+              <a:rPr lang="tr-TR" dirty="0" err="1"/>
+              <a:t>After</a:t>
+            </a:r>
+            <a:r>
+              <a:rPr lang="tr-TR" dirty="0"/>
+              <a:t> </a:t>
+            </a:r>
+            <a:r>
+              <a:rPr lang="tr-TR" dirty="0" err="1"/>
+              <a:t>then</a:t>
+            </a:r>
+            <a:r>
+              <a:rPr lang="tr-TR" dirty="0"/>
+              <a:t> </a:t>
+            </a:r>
+            <a:r>
+              <a:rPr lang="tr-TR" dirty="0" err="1"/>
+              <a:t>changed</a:t>
+            </a:r>
+            <a:r>
+              <a:rPr lang="tr-TR" dirty="0"/>
+              <a:t> </a:t>
+            </a:r>
+            <a:r>
+              <a:rPr lang="tr-TR" dirty="0" err="1"/>
+              <a:t>one</a:t>
+            </a:r>
+            <a:r>
+              <a:rPr lang="tr-TR" dirty="0"/>
+              <a:t> of </a:t>
+            </a:r>
+            <a:r>
+              <a:rPr lang="tr-TR" dirty="0" err="1"/>
+              <a:t>the</a:t>
+            </a:r>
+            <a:r>
+              <a:rPr lang="tr-TR" dirty="0"/>
+              <a:t> </a:t>
+            </a:r>
+            <a:r>
+              <a:rPr lang="tr-TR" dirty="0" err="1"/>
+              <a:t>blocks</a:t>
+            </a:r>
+            <a:r>
+              <a:rPr lang="tr-TR" dirty="0"/>
+              <a:t> </a:t>
+            </a:r>
+            <a:r>
+              <a:rPr lang="tr-TR" dirty="0" err="1"/>
+              <a:t>with</a:t>
+            </a:r>
+            <a:r>
+              <a:rPr lang="tr-TR" dirty="0"/>
+              <a:t> RL </a:t>
+            </a:r>
+            <a:r>
+              <a:rPr lang="tr-TR" dirty="0" err="1"/>
+              <a:t>agent</a:t>
+            </a:r>
+            <a:r>
+              <a:rPr lang="tr-TR" dirty="0"/>
+              <a:t> </a:t>
+            </a:r>
+            <a:r>
+              <a:rPr lang="tr-TR" dirty="0" err="1"/>
+              <a:t>and</a:t>
+            </a:r>
+            <a:r>
+              <a:rPr lang="tr-TR" dirty="0"/>
+              <a:t> </a:t>
+            </a:r>
+            <a:r>
+              <a:rPr lang="tr-TR" dirty="0" err="1"/>
+              <a:t>trained</a:t>
+            </a:r>
+            <a:r>
+              <a:rPr lang="tr-TR" dirty="0"/>
+              <a:t> .  </a:t>
+            </a:r>
+            <a:r>
+              <a:rPr lang="tr-TR" dirty="0" err="1"/>
+              <a:t>We</a:t>
+            </a:r>
+            <a:r>
+              <a:rPr lang="tr-TR" dirty="0"/>
+              <a:t> </a:t>
+            </a:r>
+            <a:r>
+              <a:rPr lang="tr-TR" dirty="0" err="1"/>
+              <a:t>did</a:t>
+            </a:r>
+            <a:r>
+              <a:rPr lang="tr-TR" dirty="0"/>
+              <a:t> not </a:t>
+            </a:r>
+            <a:r>
+              <a:rPr lang="tr-TR" dirty="0" err="1"/>
+              <a:t>change</a:t>
+            </a:r>
+            <a:r>
+              <a:rPr lang="tr-TR" dirty="0"/>
+              <a:t> </a:t>
+            </a:r>
+            <a:r>
+              <a:rPr lang="tr-TR" dirty="0" err="1"/>
+              <a:t>both</a:t>
+            </a:r>
+            <a:r>
+              <a:rPr lang="tr-TR" dirty="0"/>
+              <a:t> of </a:t>
+            </a:r>
+            <a:r>
+              <a:rPr lang="tr-TR" dirty="0" err="1"/>
+              <a:t>these</a:t>
+            </a:r>
+            <a:r>
+              <a:rPr lang="tr-TR" dirty="0"/>
+              <a:t> </a:t>
+            </a:r>
+            <a:r>
+              <a:rPr lang="tr-TR" dirty="0" err="1"/>
+              <a:t>blocks</a:t>
+            </a:r>
+            <a:r>
+              <a:rPr lang="tr-TR" dirty="0"/>
+              <a:t> </a:t>
+            </a:r>
+            <a:r>
+              <a:rPr lang="tr-TR" dirty="0" err="1"/>
+              <a:t>simultaneously</a:t>
+            </a:r>
+            <a:r>
+              <a:rPr lang="tr-TR" dirty="0"/>
+              <a:t>. </a:t>
+            </a:r>
+            <a:r>
+              <a:rPr lang="tr-TR" dirty="0" err="1"/>
+              <a:t>If</a:t>
+            </a:r>
+            <a:r>
+              <a:rPr lang="tr-TR" dirty="0"/>
+              <a:t> it is done </a:t>
+            </a:r>
+            <a:r>
+              <a:rPr lang="tr-TR" dirty="0" err="1"/>
+              <a:t>simultaneously</a:t>
+            </a:r>
+            <a:r>
+              <a:rPr lang="tr-TR" dirty="0"/>
+              <a:t> </a:t>
+            </a:r>
+            <a:r>
+              <a:rPr lang="tr-TR" dirty="0" err="1"/>
+              <a:t>agent</a:t>
+            </a:r>
+            <a:r>
+              <a:rPr lang="tr-TR" dirty="0"/>
+              <a:t> </a:t>
+            </a:r>
+            <a:r>
+              <a:rPr lang="tr-TR" dirty="0" err="1"/>
+              <a:t>training</a:t>
+            </a:r>
+            <a:r>
+              <a:rPr lang="tr-TR" dirty="0"/>
+              <a:t> </a:t>
+            </a:r>
+            <a:r>
+              <a:rPr lang="tr-TR" dirty="0" err="1"/>
+              <a:t>itself</a:t>
+            </a:r>
+            <a:r>
+              <a:rPr lang="tr-TR" dirty="0"/>
+              <a:t> </a:t>
+            </a:r>
+            <a:r>
+              <a:rPr lang="tr-TR" dirty="0" err="1"/>
+              <a:t>wrongly</a:t>
+            </a:r>
+            <a:r>
+              <a:rPr lang="tr-TR" dirty="0"/>
+              <a:t> </a:t>
+            </a:r>
+            <a:r>
+              <a:rPr lang="tr-TR" dirty="0" err="1"/>
+              <a:t>due</a:t>
+            </a:r>
+            <a:r>
+              <a:rPr lang="tr-TR" dirty="0"/>
+              <a:t> </a:t>
+            </a:r>
+            <a:r>
+              <a:rPr lang="tr-TR" dirty="0" err="1"/>
+              <a:t>to</a:t>
+            </a:r>
+            <a:r>
+              <a:rPr lang="tr-TR" dirty="0"/>
+              <a:t> </a:t>
+            </a:r>
+            <a:r>
+              <a:rPr lang="tr-TR" dirty="0" err="1"/>
+              <a:t>the</a:t>
+            </a:r>
+            <a:r>
+              <a:rPr lang="tr-TR" dirty="0"/>
+              <a:t> </a:t>
+            </a:r>
+            <a:r>
+              <a:rPr lang="tr-TR" dirty="0" err="1"/>
+              <a:t>two</a:t>
+            </a:r>
+            <a:r>
+              <a:rPr lang="tr-TR" dirty="0"/>
+              <a:t> </a:t>
+            </a:r>
+            <a:r>
+              <a:rPr lang="tr-TR" dirty="0" err="1"/>
+              <a:t>unknown</a:t>
+            </a:r>
+            <a:r>
+              <a:rPr lang="tr-TR" dirty="0"/>
+              <a:t> </a:t>
+            </a:r>
+          </a:p>
+          <a:p>
+            <a:pPr marL="0" lvl="0" indent="0" algn="l" rtl="0">
+              <a:spcBef>
+                <a:spcPts val="0"/>
+              </a:spcBef>
+              <a:spcAft>
+                <a:spcPts val="0"/>
+              </a:spcAft>
+              <a:buNone/>
+            </a:pPr>
+            <a:r>
+              <a:rPr lang="tr-TR" dirty="0" err="1"/>
+              <a:t>dynamic</a:t>
+            </a:r>
+            <a:r>
+              <a:rPr lang="tr-TR" dirty="0"/>
+              <a:t> </a:t>
+            </a:r>
+            <a:r>
+              <a:rPr lang="tr-TR" dirty="0" err="1"/>
+              <a:t>struct</a:t>
+            </a:r>
+            <a:endParaRPr lang="tr-TR" dirty="0"/>
+          </a:p>
+          <a:p>
+            <a:pPr marL="0" lvl="0" indent="0" algn="l" rtl="0">
+              <a:spcBef>
+                <a:spcPts val="0"/>
+              </a:spcBef>
+              <a:spcAft>
+                <a:spcPts val="0"/>
+              </a:spcAft>
+              <a:buNone/>
+            </a:pPr>
+            <a:endParaRPr lang="tr-TR" dirty="0"/>
           </a:p>
         </p:txBody>
       </p:sp>
@@ -2188,6 +3617,85 @@
               </a:spcAft>
               <a:buNone/>
             </a:pPr>
+            <a:r>
+              <a:rPr lang="tr-TR" dirty="0" err="1"/>
+              <a:t>This</a:t>
+            </a:r>
+            <a:r>
+              <a:rPr lang="tr-TR" dirty="0"/>
+              <a:t> is PID </a:t>
+            </a:r>
+            <a:r>
+              <a:rPr lang="tr-TR" dirty="0" err="1"/>
+              <a:t>control</a:t>
+            </a:r>
+            <a:r>
+              <a:rPr lang="tr-TR" dirty="0"/>
+              <a:t> </a:t>
+            </a:r>
+            <a:r>
+              <a:rPr lang="tr-TR" dirty="0" err="1"/>
+              <a:t>block</a:t>
+            </a:r>
+            <a:r>
+              <a:rPr lang="tr-TR" dirty="0"/>
+              <a:t> </a:t>
+            </a:r>
+            <a:r>
+              <a:rPr lang="tr-TR" dirty="0" err="1"/>
+              <a:t>for</a:t>
+            </a:r>
+            <a:r>
+              <a:rPr lang="tr-TR" dirty="0"/>
+              <a:t> </a:t>
+            </a:r>
+            <a:r>
+              <a:rPr lang="tr-TR" dirty="0" err="1"/>
+              <a:t>attitude</a:t>
+            </a:r>
+            <a:r>
+              <a:rPr lang="tr-TR" dirty="0"/>
+              <a:t> </a:t>
+            </a:r>
+            <a:r>
+              <a:rPr lang="tr-TR" dirty="0" err="1"/>
+              <a:t>controller</a:t>
+            </a:r>
+            <a:r>
+              <a:rPr lang="tr-TR" dirty="0"/>
+              <a:t> </a:t>
+            </a:r>
+            <a:r>
+              <a:rPr lang="tr-TR" dirty="0" err="1"/>
+              <a:t>for</a:t>
+            </a:r>
+            <a:r>
+              <a:rPr lang="tr-TR" dirty="0"/>
+              <a:t> </a:t>
+            </a:r>
+            <a:r>
+              <a:rPr lang="tr-TR" dirty="0" err="1"/>
+              <a:t>quadcopter</a:t>
+            </a:r>
+            <a:r>
+              <a:rPr lang="tr-TR" dirty="0"/>
+              <a:t>.</a:t>
+            </a:r>
+          </a:p>
+          <a:p>
+            <a:pPr marL="0" lvl="0" indent="0" algn="l" rtl="0">
+              <a:spcBef>
+                <a:spcPts val="0"/>
+              </a:spcBef>
+              <a:spcAft>
+                <a:spcPts val="0"/>
+              </a:spcAft>
+              <a:buNone/>
+            </a:pPr>
+            <a:r>
+              <a:rPr lang="tr-TR" dirty="0"/>
+              <a:t>…………………………………….</a:t>
+            </a:r>
             <a:endParaRPr dirty="0"/>
           </a:p>
         </p:txBody>
@@ -2357,7 +3865,220 @@
               </a:spcAft>
               <a:buNone/>
             </a:pPr>
-            <a:endParaRPr dirty="0"/>
+            <a:r>
+              <a:rPr lang="tr-TR" dirty="0" err="1"/>
+              <a:t>This</a:t>
+            </a:r>
+            <a:r>
+              <a:rPr lang="tr-TR" dirty="0"/>
+              <a:t> is </a:t>
+            </a:r>
+            <a:r>
+              <a:rPr lang="tr-TR" dirty="0" err="1"/>
+              <a:t>the</a:t>
+            </a:r>
+            <a:r>
+              <a:rPr lang="tr-TR" dirty="0"/>
+              <a:t> </a:t>
+            </a:r>
+            <a:r>
+              <a:rPr lang="tr-TR" dirty="0" err="1"/>
+              <a:t>agent</a:t>
+            </a:r>
+            <a:r>
+              <a:rPr lang="tr-TR" dirty="0"/>
+              <a:t> </a:t>
+            </a:r>
+            <a:r>
+              <a:rPr lang="tr-TR" dirty="0" err="1"/>
+              <a:t>and</a:t>
+            </a:r>
+            <a:r>
+              <a:rPr lang="tr-TR" dirty="0"/>
+              <a:t> </a:t>
+            </a:r>
+            <a:r>
+              <a:rPr lang="tr-TR" dirty="0" err="1"/>
+              <a:t>its</a:t>
+            </a:r>
+            <a:r>
+              <a:rPr lang="tr-TR" dirty="0"/>
+              <a:t> </a:t>
+            </a:r>
+            <a:r>
+              <a:rPr lang="tr-TR" dirty="0" err="1"/>
+              <a:t>environment</a:t>
+            </a:r>
+            <a:r>
+              <a:rPr lang="tr-TR" dirty="0"/>
+              <a:t> </a:t>
+            </a:r>
+            <a:r>
+              <a:rPr lang="tr-TR" dirty="0" err="1"/>
+              <a:t>block</a:t>
+            </a:r>
+            <a:r>
+              <a:rPr lang="tr-TR" dirty="0"/>
+              <a:t>. </a:t>
+            </a:r>
+          </a:p>
+          <a:p>
+            <a:pPr marL="0" lvl="0" indent="0" algn="l" rtl="0">
+              <a:spcBef>
+                <a:spcPts val="0"/>
+              </a:spcBef>
+              <a:spcAft>
+                <a:spcPts val="0"/>
+              </a:spcAft>
+              <a:buNone/>
+            </a:pPr>
+            <a:endParaRPr lang="tr-TR" dirty="0"/>
+          </a:p>
+          <a:p>
+            <a:pPr marL="0" lvl="0" indent="0" algn="l" rtl="0">
+              <a:spcBef>
+                <a:spcPts val="0"/>
+              </a:spcBef>
+              <a:spcAft>
+                <a:spcPts val="0"/>
+              </a:spcAft>
+              <a:buNone/>
+            </a:pPr>
+            <a:r>
+              <a:rPr lang="tr-TR" dirty="0" err="1"/>
+              <a:t>Input</a:t>
+            </a:r>
+            <a:r>
+              <a:rPr lang="tr-TR" dirty="0"/>
+              <a:t> </a:t>
+            </a:r>
+            <a:r>
+              <a:rPr lang="tr-TR" dirty="0" err="1"/>
+              <a:t>parameters</a:t>
+            </a:r>
+            <a:r>
+              <a:rPr lang="tr-TR" dirty="0"/>
+              <a:t> </a:t>
+            </a:r>
+            <a:r>
+              <a:rPr lang="tr-TR" dirty="0" err="1"/>
+              <a:t>are</a:t>
+            </a:r>
+            <a:r>
+              <a:rPr lang="tr-TR" dirty="0"/>
+              <a:t> </a:t>
+            </a:r>
+            <a:r>
+              <a:rPr lang="tr-TR" dirty="0" err="1"/>
+              <a:t>observation</a:t>
+            </a:r>
+            <a:r>
+              <a:rPr lang="tr-TR" dirty="0"/>
+              <a:t>, </a:t>
+            </a:r>
+            <a:r>
+              <a:rPr lang="tr-TR" dirty="0" err="1"/>
+              <a:t>reward</a:t>
+            </a:r>
+            <a:r>
+              <a:rPr lang="tr-TR" dirty="0"/>
+              <a:t> </a:t>
+            </a:r>
+            <a:r>
+              <a:rPr lang="tr-TR" dirty="0" err="1"/>
+              <a:t>Function</a:t>
+            </a:r>
+            <a:r>
+              <a:rPr lang="tr-TR" dirty="0"/>
+              <a:t> </a:t>
+            </a:r>
+            <a:r>
+              <a:rPr lang="tr-TR" dirty="0" err="1"/>
+              <a:t>and</a:t>
+            </a:r>
+            <a:r>
+              <a:rPr lang="tr-TR" dirty="0"/>
+              <a:t> </a:t>
+            </a:r>
+            <a:r>
+              <a:rPr lang="tr-TR" dirty="0" err="1"/>
+              <a:t>flag</a:t>
+            </a:r>
+            <a:r>
+              <a:rPr lang="tr-TR" dirty="0"/>
+              <a:t>.  </a:t>
+            </a:r>
+            <a:r>
+              <a:rPr lang="tr-TR" dirty="0" err="1"/>
+              <a:t>the</a:t>
+            </a:r>
+            <a:r>
+              <a:rPr lang="tr-TR" dirty="0"/>
+              <a:t> </a:t>
+            </a:r>
+            <a:r>
+              <a:rPr lang="tr-TR" dirty="0" err="1"/>
+              <a:t>output</a:t>
+            </a:r>
+            <a:r>
+              <a:rPr lang="tr-TR" dirty="0"/>
+              <a:t> is </a:t>
+            </a:r>
+            <a:r>
+              <a:rPr lang="tr-TR" dirty="0" err="1"/>
+              <a:t>the</a:t>
+            </a:r>
+            <a:r>
+              <a:rPr lang="tr-TR" dirty="0"/>
+              <a:t> </a:t>
+            </a:r>
+            <a:r>
+              <a:rPr lang="tr-TR" dirty="0" err="1"/>
+              <a:t>action</a:t>
+            </a:r>
+            <a:r>
+              <a:rPr lang="tr-TR" dirty="0"/>
+              <a:t>.</a:t>
+            </a:r>
+          </a:p>
+          <a:p>
+            <a:pPr marL="0" lvl="0" indent="0" algn="l" rtl="0">
+              <a:spcBef>
+                <a:spcPts val="0"/>
+              </a:spcBef>
+              <a:spcAft>
+                <a:spcPts val="0"/>
+              </a:spcAft>
+              <a:buNone/>
+            </a:pPr>
+            <a:r>
+              <a:rPr lang="tr-TR" dirty="0"/>
+              <a:t> </a:t>
+            </a:r>
+          </a:p>
+          <a:p>
+            <a:pPr marL="0" lvl="0" indent="0" algn="l" rtl="0">
+              <a:spcBef>
+                <a:spcPts val="0"/>
+              </a:spcBef>
+              <a:spcAft>
+                <a:spcPts val="0"/>
+              </a:spcAft>
+              <a:buNone/>
+            </a:pPr>
+            <a:endParaRPr lang="tr-TR" dirty="0"/>
+          </a:p>
+          <a:p>
+            <a:pPr marL="0" lvl="0" indent="0" algn="l" rtl="0">
+              <a:spcBef>
+                <a:spcPts val="0"/>
+              </a:spcBef>
+              <a:spcAft>
+                <a:spcPts val="0"/>
+              </a:spcAft>
+              <a:buNone/>
+            </a:pPr>
+            <a:endParaRPr lang="tr-TR" dirty="0"/>
           </a:p>
         </p:txBody>
       </p:sp>
@@ -2526,6 +4247,541 @@
               </a:spcAft>
               <a:buNone/>
             </a:pPr>
+            <a:r>
+              <a:rPr lang="tr-TR" dirty="0" err="1"/>
+              <a:t>This</a:t>
+            </a:r>
+            <a:r>
+              <a:rPr lang="tr-TR" dirty="0"/>
+              <a:t> is </a:t>
+            </a:r>
+            <a:r>
+              <a:rPr lang="tr-TR" dirty="0" err="1"/>
+              <a:t>our</a:t>
+            </a:r>
+            <a:r>
+              <a:rPr lang="tr-TR" dirty="0"/>
+              <a:t> </a:t>
+            </a:r>
+            <a:r>
+              <a:rPr lang="tr-TR" dirty="0" err="1"/>
+              <a:t>first</a:t>
+            </a:r>
+            <a:r>
+              <a:rPr lang="tr-TR" dirty="0"/>
+              <a:t> </a:t>
+            </a:r>
+            <a:r>
+              <a:rPr lang="tr-TR" dirty="0" err="1"/>
+              <a:t>output</a:t>
+            </a:r>
+            <a:r>
+              <a:rPr lang="tr-TR" dirty="0"/>
+              <a:t> of </a:t>
+            </a:r>
+            <a:r>
+              <a:rPr lang="tr-TR" dirty="0" err="1"/>
+              <a:t>trained</a:t>
+            </a:r>
+            <a:r>
+              <a:rPr lang="tr-TR" dirty="0"/>
+              <a:t> RL </a:t>
+            </a:r>
+            <a:r>
+              <a:rPr lang="tr-TR" dirty="0" err="1"/>
+              <a:t>agent</a:t>
+            </a:r>
+            <a:r>
+              <a:rPr lang="tr-TR" dirty="0"/>
+              <a:t>. </a:t>
+            </a:r>
+          </a:p>
+          <a:p>
+            <a:pPr marL="0" lvl="0" indent="0" algn="l" rtl="0">
+              <a:spcBef>
+                <a:spcPts val="0"/>
+              </a:spcBef>
+              <a:spcAft>
+                <a:spcPts val="0"/>
+              </a:spcAft>
+              <a:buNone/>
+            </a:pPr>
+            <a:r>
+              <a:rPr lang="tr-TR" dirty="0" err="1"/>
+              <a:t>This</a:t>
+            </a:r>
+            <a:r>
+              <a:rPr lang="tr-TR" dirty="0"/>
+              <a:t> is not an </a:t>
+            </a:r>
+            <a:r>
+              <a:rPr lang="tr-TR" dirty="0" err="1"/>
+              <a:t>true</a:t>
+            </a:r>
+            <a:r>
+              <a:rPr lang="tr-TR" dirty="0"/>
+              <a:t> </a:t>
+            </a:r>
+            <a:r>
+              <a:rPr lang="tr-TR" dirty="0" err="1"/>
+              <a:t>for</a:t>
+            </a:r>
+            <a:r>
+              <a:rPr lang="tr-TR" dirty="0"/>
+              <a:t> us </a:t>
+            </a:r>
+            <a:r>
+              <a:rPr lang="tr-TR" dirty="0" err="1"/>
+              <a:t>for</a:t>
+            </a:r>
+            <a:r>
+              <a:rPr lang="tr-TR" dirty="0"/>
+              <a:t> </a:t>
+            </a:r>
+            <a:r>
+              <a:rPr lang="tr-TR" dirty="0" err="1"/>
+              <a:t>this</a:t>
+            </a:r>
+            <a:r>
+              <a:rPr lang="tr-TR" dirty="0"/>
+              <a:t> </a:t>
+            </a:r>
+            <a:r>
+              <a:rPr lang="tr-TR" dirty="0" err="1"/>
+              <a:t>because</a:t>
+            </a:r>
+            <a:r>
+              <a:rPr lang="tr-TR" dirty="0"/>
+              <a:t> </a:t>
+            </a:r>
+            <a:r>
+              <a:rPr lang="tr-TR" dirty="0" err="1"/>
+              <a:t>we</a:t>
+            </a:r>
+            <a:r>
+              <a:rPr lang="tr-TR" dirty="0"/>
+              <a:t> </a:t>
+            </a:r>
+            <a:r>
+              <a:rPr lang="tr-TR" dirty="0" err="1"/>
+              <a:t>only</a:t>
+            </a:r>
+            <a:r>
+              <a:rPr lang="tr-TR" dirty="0"/>
+              <a:t> </a:t>
+            </a:r>
+            <a:r>
+              <a:rPr lang="tr-TR" dirty="0" err="1"/>
+              <a:t>focused</a:t>
+            </a:r>
+            <a:r>
+              <a:rPr lang="tr-TR" dirty="0"/>
+              <a:t> </a:t>
+            </a:r>
+            <a:r>
+              <a:rPr lang="tr-TR" dirty="0" err="1"/>
+              <a:t>to</a:t>
+            </a:r>
+            <a:r>
+              <a:rPr lang="tr-TR" dirty="0"/>
+              <a:t> </a:t>
+            </a:r>
+            <a:r>
+              <a:rPr lang="tr-TR" dirty="0" err="1"/>
+              <a:t>obtain</a:t>
+            </a:r>
+            <a:r>
+              <a:rPr lang="tr-TR" dirty="0"/>
+              <a:t> </a:t>
+            </a:r>
+            <a:r>
+              <a:rPr lang="tr-TR" dirty="0" err="1"/>
+              <a:t>some</a:t>
+            </a:r>
+            <a:r>
+              <a:rPr lang="tr-TR" dirty="0"/>
+              <a:t> data </a:t>
+            </a:r>
+            <a:r>
+              <a:rPr lang="tr-TR" dirty="0" err="1"/>
+              <a:t>from</a:t>
+            </a:r>
+            <a:r>
+              <a:rPr lang="tr-TR" dirty="0"/>
+              <a:t> </a:t>
+            </a:r>
+            <a:r>
+              <a:rPr lang="tr-TR" dirty="0" err="1"/>
+              <a:t>the</a:t>
+            </a:r>
+            <a:r>
+              <a:rPr lang="tr-TR" dirty="0"/>
+              <a:t> </a:t>
+            </a:r>
+            <a:r>
+              <a:rPr lang="tr-TR" dirty="0" err="1"/>
+              <a:t>agent</a:t>
+            </a:r>
+            <a:r>
+              <a:rPr lang="tr-TR" dirty="0"/>
+              <a:t> </a:t>
+            </a:r>
+            <a:r>
+              <a:rPr lang="tr-TR" dirty="0" err="1"/>
+              <a:t>block</a:t>
+            </a:r>
+            <a:r>
+              <a:rPr lang="tr-TR" dirty="0"/>
+              <a:t>.</a:t>
+            </a:r>
+          </a:p>
+          <a:p>
+            <a:pPr marL="0" lvl="0" indent="0" algn="l" rtl="0">
+              <a:spcBef>
+                <a:spcPts val="0"/>
+              </a:spcBef>
+              <a:spcAft>
+                <a:spcPts val="0"/>
+              </a:spcAft>
+              <a:buNone/>
+            </a:pPr>
+            <a:r>
+              <a:rPr lang="tr-TR" dirty="0" err="1"/>
+              <a:t>This</a:t>
+            </a:r>
+            <a:r>
+              <a:rPr lang="tr-TR" dirty="0"/>
+              <a:t> is </a:t>
+            </a:r>
+            <a:r>
+              <a:rPr lang="tr-TR" dirty="0" err="1"/>
+              <a:t>trained</a:t>
+            </a:r>
+            <a:r>
+              <a:rPr lang="tr-TR" dirty="0"/>
+              <a:t> </a:t>
+            </a:r>
+            <a:r>
+              <a:rPr lang="tr-TR" dirty="0" err="1"/>
+              <a:t>with</a:t>
+            </a:r>
+            <a:r>
+              <a:rPr lang="tr-TR" dirty="0"/>
+              <a:t> 6 </a:t>
+            </a:r>
+            <a:r>
+              <a:rPr lang="tr-TR" dirty="0" err="1"/>
+              <a:t>episodes</a:t>
+            </a:r>
+            <a:r>
+              <a:rPr lang="tr-TR" dirty="0"/>
+              <a:t>. </a:t>
+            </a:r>
+            <a:r>
+              <a:rPr lang="tr-TR" dirty="0" err="1"/>
+              <a:t>This</a:t>
+            </a:r>
+            <a:r>
+              <a:rPr lang="tr-TR" dirty="0"/>
+              <a:t> is not </a:t>
+            </a:r>
+            <a:r>
+              <a:rPr lang="tr-TR" dirty="0" err="1"/>
+              <a:t>enough</a:t>
+            </a:r>
+            <a:r>
+              <a:rPr lang="tr-TR" dirty="0"/>
+              <a:t> </a:t>
+            </a:r>
+            <a:r>
+              <a:rPr lang="tr-TR" dirty="0" err="1"/>
+              <a:t>and</a:t>
+            </a:r>
+            <a:r>
+              <a:rPr lang="tr-TR" dirty="0"/>
+              <a:t> </a:t>
+            </a:r>
+            <a:r>
+              <a:rPr lang="tr-TR" dirty="0" err="1"/>
+              <a:t>episodes</a:t>
+            </a:r>
+            <a:r>
+              <a:rPr lang="tr-TR" dirty="0"/>
+              <a:t> </a:t>
+            </a:r>
+            <a:r>
+              <a:rPr lang="tr-TR" dirty="0" err="1"/>
+              <a:t>will</a:t>
+            </a:r>
+            <a:r>
+              <a:rPr lang="tr-TR" dirty="0"/>
+              <a:t> be </a:t>
+            </a:r>
+            <a:r>
+              <a:rPr lang="tr-TR" dirty="0" err="1"/>
+              <a:t>more</a:t>
+            </a:r>
+            <a:r>
+              <a:rPr lang="tr-TR" dirty="0"/>
+              <a:t> </a:t>
+            </a:r>
+            <a:r>
+              <a:rPr lang="tr-TR" dirty="0" err="1"/>
+              <a:t>and</a:t>
+            </a:r>
+            <a:r>
+              <a:rPr lang="tr-TR" dirty="0"/>
+              <a:t> </a:t>
+            </a:r>
+            <a:r>
+              <a:rPr lang="tr-TR" dirty="0" err="1"/>
+              <a:t>more</a:t>
+            </a:r>
+            <a:r>
+              <a:rPr lang="tr-TR" dirty="0"/>
+              <a:t> </a:t>
+            </a:r>
+            <a:r>
+              <a:rPr lang="tr-TR" dirty="0" err="1"/>
+              <a:t>to</a:t>
+            </a:r>
+            <a:r>
+              <a:rPr lang="tr-TR" dirty="0"/>
+              <a:t> </a:t>
+            </a:r>
+            <a:r>
+              <a:rPr lang="tr-TR" dirty="0" err="1"/>
+              <a:t>obtain</a:t>
+            </a:r>
+            <a:r>
+              <a:rPr lang="tr-TR" dirty="0"/>
+              <a:t> </a:t>
+            </a:r>
+            <a:r>
+              <a:rPr lang="tr-TR" dirty="0" err="1"/>
+              <a:t>better</a:t>
+            </a:r>
+            <a:r>
+              <a:rPr lang="tr-TR" dirty="0"/>
+              <a:t> </a:t>
+            </a:r>
+            <a:r>
+              <a:rPr lang="tr-TR" dirty="0" err="1"/>
+              <a:t>training</a:t>
+            </a:r>
+            <a:r>
+              <a:rPr lang="tr-TR" dirty="0"/>
+              <a:t> </a:t>
+            </a:r>
+            <a:r>
+              <a:rPr lang="tr-TR" dirty="0" err="1"/>
+              <a:t>agent</a:t>
+            </a:r>
+            <a:r>
+              <a:rPr lang="tr-TR" dirty="0"/>
+              <a:t>.</a:t>
+            </a:r>
+          </a:p>
+          <a:p>
+            <a:pPr marL="0" lvl="0" indent="0" algn="l" rtl="0">
+              <a:spcBef>
+                <a:spcPts val="0"/>
+              </a:spcBef>
+              <a:spcAft>
+                <a:spcPts val="0"/>
+              </a:spcAft>
+              <a:buNone/>
+            </a:pPr>
+            <a:r>
+              <a:rPr lang="tr-TR" dirty="0" err="1"/>
+              <a:t>This</a:t>
+            </a:r>
+            <a:r>
+              <a:rPr lang="tr-TR" dirty="0"/>
+              <a:t> </a:t>
+            </a:r>
+            <a:r>
+              <a:rPr lang="tr-TR" dirty="0" err="1"/>
+              <a:t>agent</a:t>
+            </a:r>
+            <a:r>
+              <a:rPr lang="tr-TR" dirty="0"/>
+              <a:t> is </a:t>
+            </a:r>
+            <a:r>
+              <a:rPr lang="tr-TR" dirty="0" err="1"/>
+              <a:t>negative</a:t>
+            </a:r>
+            <a:r>
+              <a:rPr lang="tr-TR" dirty="0"/>
+              <a:t> </a:t>
+            </a:r>
+            <a:r>
+              <a:rPr lang="tr-TR" dirty="0" err="1"/>
+              <a:t>because</a:t>
+            </a:r>
+            <a:r>
+              <a:rPr lang="tr-TR" dirty="0"/>
+              <a:t> of </a:t>
+            </a:r>
+            <a:r>
+              <a:rPr lang="tr-TR" dirty="0" err="1"/>
+              <a:t>the</a:t>
+            </a:r>
+            <a:r>
+              <a:rPr lang="tr-TR" dirty="0"/>
+              <a:t> </a:t>
+            </a:r>
+            <a:r>
+              <a:rPr lang="tr-TR" dirty="0" err="1"/>
+              <a:t>reward</a:t>
+            </a:r>
+            <a:r>
+              <a:rPr lang="tr-TR" dirty="0"/>
+              <a:t> </a:t>
+            </a:r>
+            <a:r>
+              <a:rPr lang="tr-TR" dirty="0" err="1"/>
+              <a:t>function</a:t>
+            </a:r>
+            <a:r>
+              <a:rPr lang="tr-TR" dirty="0"/>
+              <a:t> </a:t>
+            </a:r>
+            <a:r>
+              <a:rPr lang="tr-TR" dirty="0" err="1"/>
+              <a:t>which</a:t>
+            </a:r>
+            <a:r>
+              <a:rPr lang="tr-TR" dirty="0"/>
+              <a:t> is </a:t>
+            </a:r>
+            <a:r>
+              <a:rPr lang="tr-TR" dirty="0" err="1"/>
+              <a:t>multiplied</a:t>
+            </a:r>
+            <a:r>
+              <a:rPr lang="tr-TR" dirty="0"/>
+              <a:t> </a:t>
+            </a:r>
+            <a:r>
+              <a:rPr lang="tr-TR" dirty="0" err="1"/>
+              <a:t>by</a:t>
+            </a:r>
+            <a:r>
+              <a:rPr lang="tr-TR" dirty="0"/>
+              <a:t> -1.</a:t>
+            </a:r>
+          </a:p>
+          <a:p>
+            <a:pPr marL="0" lvl="0" indent="0" algn="l" rtl="0">
+              <a:spcBef>
+                <a:spcPts val="0"/>
+              </a:spcBef>
+              <a:spcAft>
+                <a:spcPts val="0"/>
+              </a:spcAft>
+              <a:buNone/>
+            </a:pPr>
+            <a:r>
+              <a:rPr lang="tr-TR" dirty="0" err="1"/>
+              <a:t>While</a:t>
+            </a:r>
+            <a:r>
+              <a:rPr lang="tr-TR" dirty="0"/>
+              <a:t> </a:t>
+            </a:r>
+            <a:r>
+              <a:rPr lang="tr-TR" dirty="0" err="1"/>
+              <a:t>the</a:t>
+            </a:r>
+            <a:r>
+              <a:rPr lang="tr-TR" dirty="0"/>
+              <a:t> </a:t>
+            </a:r>
+            <a:r>
+              <a:rPr lang="tr-TR" dirty="0" err="1"/>
+              <a:t>actions</a:t>
+            </a:r>
+            <a:r>
+              <a:rPr lang="tr-TR" dirty="0"/>
+              <a:t> </a:t>
+            </a:r>
+            <a:r>
+              <a:rPr lang="tr-TR" dirty="0" err="1"/>
+              <a:t>close</a:t>
+            </a:r>
+            <a:r>
+              <a:rPr lang="tr-TR" dirty="0"/>
+              <a:t> </a:t>
+            </a:r>
+            <a:r>
+              <a:rPr lang="tr-TR" dirty="0" err="1"/>
+              <a:t>to</a:t>
+            </a:r>
+            <a:r>
+              <a:rPr lang="tr-TR" dirty="0"/>
+              <a:t> </a:t>
+            </a:r>
+            <a:r>
+              <a:rPr lang="tr-TR" dirty="0" err="1"/>
+              <a:t>the</a:t>
+            </a:r>
+            <a:r>
+              <a:rPr lang="tr-TR" dirty="0"/>
+              <a:t> </a:t>
+            </a:r>
+            <a:r>
+              <a:rPr lang="tr-TR" dirty="0" err="1"/>
+              <a:t>desired</a:t>
+            </a:r>
+            <a:r>
+              <a:rPr lang="tr-TR" dirty="0"/>
+              <a:t> </a:t>
+            </a:r>
+            <a:r>
+              <a:rPr lang="tr-TR" dirty="0" err="1"/>
+              <a:t>positions</a:t>
+            </a:r>
+            <a:r>
+              <a:rPr lang="tr-TR" dirty="0"/>
+              <a:t>, </a:t>
+            </a:r>
+            <a:r>
+              <a:rPr lang="tr-TR" dirty="0" err="1"/>
+              <a:t>reward</a:t>
+            </a:r>
+            <a:r>
+              <a:rPr lang="tr-TR" dirty="0"/>
+              <a:t> </a:t>
+            </a:r>
+            <a:r>
+              <a:rPr lang="tr-TR" dirty="0" err="1"/>
+              <a:t>will</a:t>
+            </a:r>
+            <a:r>
+              <a:rPr lang="tr-TR" dirty="0"/>
+              <a:t> be </a:t>
+            </a:r>
+            <a:r>
+              <a:rPr lang="tr-TR" dirty="0" err="1"/>
+              <a:t>around</a:t>
+            </a:r>
+            <a:r>
+              <a:rPr lang="tr-TR" dirty="0"/>
+              <a:t> 0.</a:t>
+            </a:r>
+          </a:p>
+          <a:p>
+            <a:pPr marL="0" lvl="0" indent="0" algn="l" rtl="0">
+              <a:spcBef>
+                <a:spcPts val="0"/>
+              </a:spcBef>
+              <a:spcAft>
+                <a:spcPts val="0"/>
+              </a:spcAft>
+              <a:buNone/>
+            </a:pPr>
             <a:endParaRPr dirty="0"/>
           </a:p>
         </p:txBody>
@@ -2695,7 +4951,845 @@
               </a:spcAft>
               <a:buNone/>
             </a:pPr>
-            <a:endParaRPr dirty="0"/>
+            <a:r>
+              <a:rPr lang="tr-TR" dirty="0" err="1"/>
+              <a:t>Up</a:t>
+            </a:r>
+            <a:r>
+              <a:rPr lang="tr-TR" dirty="0"/>
+              <a:t> </a:t>
+            </a:r>
+            <a:r>
+              <a:rPr lang="tr-TR" dirty="0" err="1"/>
+              <a:t>to</a:t>
+            </a:r>
+            <a:r>
+              <a:rPr lang="tr-TR" dirty="0"/>
+              <a:t> </a:t>
+            </a:r>
+            <a:r>
+              <a:rPr lang="tr-TR" dirty="0" err="1"/>
+              <a:t>this</a:t>
+            </a:r>
+            <a:r>
+              <a:rPr lang="tr-TR" dirty="0"/>
+              <a:t> </a:t>
+            </a:r>
+            <a:r>
+              <a:rPr lang="tr-TR" dirty="0" err="1"/>
+              <a:t>point</a:t>
+            </a:r>
+            <a:r>
+              <a:rPr lang="tr-TR" dirty="0"/>
+              <a:t> </a:t>
+            </a:r>
+            <a:r>
+              <a:rPr lang="tr-TR" dirty="0" err="1"/>
+              <a:t>we</a:t>
+            </a:r>
+            <a:r>
+              <a:rPr lang="tr-TR" dirty="0"/>
+              <a:t> </a:t>
+            </a:r>
+            <a:r>
+              <a:rPr lang="tr-TR" dirty="0" err="1"/>
+              <a:t>created</a:t>
+            </a:r>
+            <a:r>
+              <a:rPr lang="tr-TR" dirty="0"/>
+              <a:t> </a:t>
+            </a:r>
+            <a:r>
+              <a:rPr lang="tr-TR" dirty="0" err="1"/>
+              <a:t>the</a:t>
+            </a:r>
+            <a:r>
+              <a:rPr lang="tr-TR" dirty="0"/>
+              <a:t> </a:t>
+            </a:r>
+            <a:r>
+              <a:rPr lang="tr-TR" dirty="0" err="1"/>
+              <a:t>running</a:t>
+            </a:r>
+            <a:r>
+              <a:rPr lang="tr-TR" dirty="0"/>
+              <a:t> </a:t>
+            </a:r>
+            <a:r>
+              <a:rPr lang="tr-TR" dirty="0" err="1"/>
+              <a:t>environment</a:t>
+            </a:r>
+            <a:r>
+              <a:rPr lang="tr-TR" dirty="0"/>
+              <a:t> </a:t>
+            </a:r>
+            <a:r>
+              <a:rPr lang="tr-TR" dirty="0" err="1"/>
+              <a:t>without</a:t>
+            </a:r>
+            <a:r>
+              <a:rPr lang="tr-TR" dirty="0"/>
+              <a:t> </a:t>
+            </a:r>
+            <a:r>
+              <a:rPr lang="tr-TR" dirty="0" err="1"/>
+              <a:t>any</a:t>
+            </a:r>
+            <a:r>
+              <a:rPr lang="tr-TR" dirty="0"/>
+              <a:t> problem </a:t>
+            </a:r>
+            <a:r>
+              <a:rPr lang="tr-TR" dirty="0" err="1"/>
+              <a:t>with</a:t>
+            </a:r>
+            <a:r>
+              <a:rPr lang="tr-TR" dirty="0"/>
+              <a:t> PID </a:t>
+            </a:r>
+            <a:r>
+              <a:rPr lang="tr-TR" dirty="0" err="1"/>
+              <a:t>system</a:t>
+            </a:r>
+            <a:r>
+              <a:rPr lang="tr-TR" dirty="0"/>
+              <a:t>.</a:t>
+            </a:r>
+          </a:p>
+          <a:p>
+            <a:pPr marL="0" lvl="0" indent="0" algn="l" rtl="0">
+              <a:spcBef>
+                <a:spcPts val="0"/>
+              </a:spcBef>
+              <a:spcAft>
+                <a:spcPts val="0"/>
+              </a:spcAft>
+              <a:buNone/>
+            </a:pPr>
+            <a:r>
+              <a:rPr lang="tr-TR" dirty="0"/>
+              <a:t>Agent </a:t>
+            </a:r>
+            <a:r>
+              <a:rPr lang="tr-TR" dirty="0" err="1"/>
+              <a:t>trainig</a:t>
+            </a:r>
+            <a:r>
+              <a:rPr lang="tr-TR" dirty="0"/>
+              <a:t> </a:t>
+            </a:r>
+            <a:r>
+              <a:rPr lang="tr-TR" dirty="0" err="1"/>
+              <a:t>and</a:t>
+            </a:r>
+            <a:r>
+              <a:rPr lang="tr-TR" dirty="0"/>
+              <a:t>  </a:t>
+            </a:r>
+            <a:r>
+              <a:rPr lang="tr-TR" dirty="0" err="1"/>
+              <a:t>optimizing</a:t>
+            </a:r>
+            <a:r>
+              <a:rPr lang="tr-TR" dirty="0"/>
+              <a:t> </a:t>
+            </a:r>
+            <a:r>
+              <a:rPr lang="tr-TR" dirty="0" err="1"/>
+              <a:t>reward</a:t>
+            </a:r>
+            <a:r>
+              <a:rPr lang="tr-TR" dirty="0"/>
+              <a:t> </a:t>
+            </a:r>
+            <a:r>
+              <a:rPr lang="tr-TR" dirty="0" err="1"/>
+              <a:t>function</a:t>
+            </a:r>
+            <a:r>
+              <a:rPr lang="tr-TR" dirty="0"/>
+              <a:t> </a:t>
+            </a:r>
+            <a:r>
+              <a:rPr lang="tr-TR" dirty="0" err="1"/>
+              <a:t>trials</a:t>
+            </a:r>
+            <a:r>
+              <a:rPr lang="tr-TR" dirty="0"/>
+              <a:t> </a:t>
+            </a:r>
+            <a:r>
+              <a:rPr lang="tr-TR" dirty="0" err="1"/>
+              <a:t>started</a:t>
+            </a:r>
+            <a:r>
+              <a:rPr lang="tr-TR" dirty="0"/>
+              <a:t> </a:t>
+            </a:r>
+            <a:r>
+              <a:rPr lang="tr-TR" dirty="0" err="1"/>
+              <a:t>and</a:t>
+            </a:r>
+            <a:r>
+              <a:rPr lang="tr-TR" dirty="0"/>
+              <a:t> </a:t>
+            </a:r>
+            <a:r>
+              <a:rPr lang="tr-TR" dirty="0" err="1"/>
+              <a:t>continue</a:t>
+            </a:r>
+            <a:r>
+              <a:rPr lang="tr-TR" dirty="0"/>
+              <a:t> but has </a:t>
+            </a:r>
+            <a:r>
+              <a:rPr lang="tr-TR" dirty="0" err="1"/>
+              <a:t>some</a:t>
+            </a:r>
+            <a:r>
+              <a:rPr lang="tr-TR" dirty="0"/>
+              <a:t> </a:t>
+            </a:r>
+            <a:r>
+              <a:rPr lang="tr-TR" dirty="0" err="1"/>
+              <a:t>problems</a:t>
+            </a:r>
+            <a:r>
+              <a:rPr lang="tr-TR" dirty="0"/>
+              <a:t>. </a:t>
+            </a:r>
+            <a:r>
+              <a:rPr lang="tr-TR" dirty="0" err="1"/>
+              <a:t>Therefore</a:t>
+            </a:r>
+            <a:r>
+              <a:rPr lang="tr-TR" dirty="0"/>
+              <a:t> </a:t>
+            </a:r>
+            <a:r>
+              <a:rPr lang="tr-TR" dirty="0" err="1"/>
+              <a:t>we</a:t>
+            </a:r>
+            <a:r>
+              <a:rPr lang="tr-TR" dirty="0"/>
+              <a:t> </a:t>
+            </a:r>
+            <a:r>
+              <a:rPr lang="tr-TR" dirty="0" err="1"/>
+              <a:t>will</a:t>
+            </a:r>
+            <a:r>
+              <a:rPr lang="tr-TR" dirty="0"/>
+              <a:t> </a:t>
+            </a:r>
+            <a:r>
+              <a:rPr lang="tr-TR" dirty="0" err="1"/>
+              <a:t>solve</a:t>
+            </a:r>
+            <a:r>
+              <a:rPr lang="tr-TR" dirty="0"/>
+              <a:t> </a:t>
+            </a:r>
+            <a:r>
+              <a:rPr lang="tr-TR" dirty="0" err="1"/>
+              <a:t>the</a:t>
+            </a:r>
+            <a:r>
+              <a:rPr lang="tr-TR" dirty="0"/>
+              <a:t> </a:t>
+            </a:r>
+            <a:r>
+              <a:rPr lang="tr-TR" dirty="0" err="1"/>
+              <a:t>training</a:t>
+            </a:r>
+            <a:r>
+              <a:rPr lang="tr-TR" dirty="0"/>
+              <a:t> </a:t>
+            </a:r>
+            <a:r>
+              <a:rPr lang="tr-TR" dirty="0" err="1"/>
+              <a:t>problems</a:t>
+            </a:r>
+            <a:r>
+              <a:rPr lang="tr-TR" dirty="0"/>
+              <a:t> </a:t>
+            </a:r>
+            <a:r>
+              <a:rPr lang="tr-TR" dirty="0" err="1"/>
+              <a:t>soon</a:t>
+            </a:r>
+            <a:r>
+              <a:rPr lang="tr-TR" dirty="0"/>
+              <a:t>.</a:t>
+            </a:r>
+          </a:p>
+          <a:p>
+            <a:pPr marL="0" lvl="0" indent="0" algn="l" rtl="0">
+              <a:spcBef>
+                <a:spcPts val="0"/>
+              </a:spcBef>
+              <a:spcAft>
+                <a:spcPts val="0"/>
+              </a:spcAft>
+              <a:buNone/>
+            </a:pPr>
+            <a:r>
+              <a:rPr lang="tr-TR" dirty="0" err="1"/>
+              <a:t>Observation</a:t>
+            </a:r>
+            <a:r>
+              <a:rPr lang="tr-TR" dirty="0"/>
+              <a:t> </a:t>
+            </a:r>
+            <a:r>
+              <a:rPr lang="tr-TR" dirty="0" err="1"/>
+              <a:t>and</a:t>
+            </a:r>
+            <a:r>
+              <a:rPr lang="tr-TR" dirty="0"/>
+              <a:t> </a:t>
+            </a:r>
+            <a:r>
+              <a:rPr lang="tr-TR" dirty="0" err="1"/>
+              <a:t>action</a:t>
+            </a:r>
+            <a:r>
+              <a:rPr lang="tr-TR" dirty="0"/>
+              <a:t> </a:t>
+            </a:r>
+            <a:r>
+              <a:rPr lang="tr-TR" dirty="0" err="1"/>
+              <a:t>block</a:t>
+            </a:r>
+            <a:r>
+              <a:rPr lang="tr-TR" dirty="0"/>
+              <a:t> </a:t>
+            </a:r>
+            <a:r>
+              <a:rPr lang="tr-TR" dirty="0" err="1"/>
+              <a:t>parameters</a:t>
+            </a:r>
+            <a:r>
+              <a:rPr lang="tr-TR" dirty="0"/>
+              <a:t> </a:t>
+            </a:r>
+            <a:r>
+              <a:rPr lang="tr-TR" dirty="0" err="1"/>
+              <a:t>was</a:t>
+            </a:r>
+            <a:r>
+              <a:rPr lang="tr-TR" dirty="0"/>
+              <a:t> not </a:t>
+            </a:r>
+            <a:r>
+              <a:rPr lang="tr-TR" dirty="0" err="1"/>
+              <a:t>limited</a:t>
+            </a:r>
+            <a:r>
+              <a:rPr lang="tr-TR" dirty="0"/>
+              <a:t> </a:t>
+            </a:r>
+            <a:r>
+              <a:rPr lang="tr-TR" dirty="0" err="1"/>
+              <a:t>and</a:t>
+            </a:r>
+            <a:r>
+              <a:rPr lang="tr-TR" dirty="0"/>
+              <a:t> </a:t>
+            </a:r>
+            <a:r>
+              <a:rPr lang="tr-TR" dirty="0" err="1"/>
+              <a:t>should</a:t>
+            </a:r>
+            <a:r>
+              <a:rPr lang="tr-TR" dirty="0"/>
+              <a:t> be </a:t>
+            </a:r>
+            <a:r>
+              <a:rPr lang="tr-TR" dirty="0" err="1"/>
+              <a:t>limited</a:t>
+            </a:r>
+            <a:r>
+              <a:rPr lang="tr-TR" dirty="0"/>
+              <a:t>.</a:t>
+            </a:r>
+          </a:p>
+          <a:p>
+            <a:pPr marL="0" lvl="0" indent="0" algn="l" rtl="0">
+              <a:spcBef>
+                <a:spcPts val="0"/>
+              </a:spcBef>
+              <a:spcAft>
+                <a:spcPts val="0"/>
+              </a:spcAft>
+              <a:buNone/>
+            </a:pPr>
+            <a:r>
+              <a:rPr lang="tr-TR" dirty="0" err="1"/>
+              <a:t>We</a:t>
+            </a:r>
+            <a:r>
+              <a:rPr lang="tr-TR" dirty="0"/>
+              <a:t> </a:t>
+            </a:r>
+            <a:r>
+              <a:rPr lang="tr-TR" dirty="0" err="1"/>
+              <a:t>have</a:t>
+            </a:r>
+            <a:r>
+              <a:rPr lang="tr-TR" dirty="0"/>
+              <a:t> </a:t>
+            </a:r>
+            <a:r>
+              <a:rPr lang="tr-TR" dirty="0" err="1"/>
+              <a:t>chosen</a:t>
+            </a:r>
+            <a:r>
+              <a:rPr lang="tr-TR" dirty="0"/>
+              <a:t> DDPG </a:t>
+            </a:r>
+            <a:r>
+              <a:rPr lang="tr-TR" dirty="0" err="1"/>
+              <a:t>and</a:t>
+            </a:r>
+            <a:r>
+              <a:rPr lang="tr-TR" dirty="0"/>
+              <a:t> PPO </a:t>
+            </a:r>
+            <a:r>
+              <a:rPr lang="tr-TR" dirty="0" err="1"/>
+              <a:t>algorithms</a:t>
+            </a:r>
+            <a:r>
+              <a:rPr lang="tr-TR" dirty="0"/>
+              <a:t>. </a:t>
+            </a:r>
+            <a:r>
+              <a:rPr lang="tr-TR" dirty="0" err="1"/>
+              <a:t>These</a:t>
+            </a:r>
+            <a:r>
+              <a:rPr lang="tr-TR" dirty="0"/>
+              <a:t> </a:t>
+            </a:r>
+            <a:r>
+              <a:rPr lang="tr-TR" dirty="0" err="1"/>
+              <a:t>algorithms</a:t>
+            </a:r>
+            <a:r>
+              <a:rPr lang="tr-TR" dirty="0"/>
+              <a:t> </a:t>
+            </a:r>
+            <a:r>
+              <a:rPr lang="tr-TR" dirty="0" err="1"/>
+              <a:t>will</a:t>
+            </a:r>
+            <a:r>
+              <a:rPr lang="tr-TR" dirty="0"/>
+              <a:t> be </a:t>
+            </a:r>
+            <a:r>
+              <a:rPr lang="tr-TR" dirty="0" err="1"/>
+              <a:t>worked</a:t>
+            </a:r>
+            <a:r>
+              <a:rPr lang="tr-TR" dirty="0"/>
+              <a:t> </a:t>
+            </a:r>
+            <a:r>
+              <a:rPr lang="tr-TR" dirty="0" err="1"/>
+              <a:t>together</a:t>
+            </a:r>
+            <a:r>
+              <a:rPr lang="tr-TR" dirty="0"/>
+              <a:t> </a:t>
+            </a:r>
+            <a:r>
+              <a:rPr lang="tr-TR" dirty="0" err="1"/>
+              <a:t>simultaneously</a:t>
+            </a:r>
+            <a:r>
+              <a:rPr lang="tr-TR" dirty="0"/>
+              <a:t> in </a:t>
+            </a:r>
+            <a:r>
+              <a:rPr lang="tr-TR" dirty="0" err="1"/>
+              <a:t>the</a:t>
+            </a:r>
+            <a:r>
+              <a:rPr lang="tr-TR" dirty="0"/>
+              <a:t> final </a:t>
+            </a:r>
+            <a:r>
+              <a:rPr lang="tr-TR" dirty="0" err="1"/>
+              <a:t>version</a:t>
+            </a:r>
+            <a:r>
+              <a:rPr lang="tr-TR" dirty="0"/>
+              <a:t> of </a:t>
+            </a:r>
+            <a:r>
+              <a:rPr lang="tr-TR" dirty="0" err="1"/>
+              <a:t>the</a:t>
+            </a:r>
+            <a:r>
+              <a:rPr lang="tr-TR" dirty="0"/>
+              <a:t> </a:t>
+            </a:r>
+            <a:r>
+              <a:rPr lang="tr-TR" dirty="0" err="1"/>
+              <a:t>project</a:t>
+            </a:r>
+            <a:r>
+              <a:rPr lang="tr-TR" dirty="0"/>
+              <a:t>.</a:t>
+            </a:r>
+          </a:p>
+          <a:p>
+            <a:pPr marL="0" lvl="0" indent="0" algn="l" rtl="0">
+              <a:spcBef>
+                <a:spcPts val="0"/>
+              </a:spcBef>
+              <a:spcAft>
+                <a:spcPts val="0"/>
+              </a:spcAft>
+              <a:buNone/>
+            </a:pPr>
+            <a:r>
+              <a:rPr lang="tr-TR" dirty="0" err="1"/>
+              <a:t>Whatever</a:t>
+            </a:r>
+            <a:r>
+              <a:rPr lang="tr-TR" dirty="0"/>
+              <a:t> </a:t>
+            </a:r>
+            <a:r>
+              <a:rPr lang="tr-TR" dirty="0" err="1"/>
+              <a:t>the</a:t>
+            </a:r>
+            <a:r>
+              <a:rPr lang="tr-TR" dirty="0"/>
+              <a:t> </a:t>
+            </a:r>
+            <a:r>
+              <a:rPr lang="tr-TR" dirty="0" err="1"/>
+              <a:t>agent</a:t>
+            </a:r>
+            <a:r>
+              <a:rPr lang="tr-TR" dirty="0"/>
+              <a:t> is </a:t>
+            </a:r>
+            <a:r>
+              <a:rPr lang="tr-TR" dirty="0" err="1"/>
+              <a:t>configuration</a:t>
+            </a:r>
+            <a:r>
+              <a:rPr lang="tr-TR" dirty="0"/>
+              <a:t> </a:t>
+            </a:r>
+            <a:r>
+              <a:rPr lang="tr-TR" dirty="0" err="1"/>
+              <a:t>parameters</a:t>
+            </a:r>
+            <a:r>
+              <a:rPr lang="tr-TR" dirty="0"/>
+              <a:t> </a:t>
+            </a:r>
+            <a:r>
+              <a:rPr lang="tr-TR" dirty="0" err="1"/>
+              <a:t>should</a:t>
+            </a:r>
+            <a:r>
+              <a:rPr lang="tr-TR" dirty="0"/>
+              <a:t> be </a:t>
+            </a:r>
+            <a:r>
+              <a:rPr lang="tr-TR" dirty="0" err="1"/>
+              <a:t>configured</a:t>
+            </a:r>
+            <a:r>
+              <a:rPr lang="tr-TR" dirty="0"/>
+              <a:t>. </a:t>
+            </a:r>
+            <a:r>
+              <a:rPr lang="tr-TR" dirty="0" err="1"/>
+              <a:t>This</a:t>
+            </a:r>
+            <a:r>
+              <a:rPr lang="tr-TR" dirty="0"/>
+              <a:t> </a:t>
+            </a:r>
+            <a:r>
+              <a:rPr lang="tr-TR" dirty="0" err="1"/>
+              <a:t>parameters</a:t>
+            </a:r>
+            <a:r>
+              <a:rPr lang="tr-TR" dirty="0"/>
+              <a:t> </a:t>
+            </a:r>
+            <a:r>
+              <a:rPr lang="tr-TR" dirty="0" err="1"/>
+              <a:t>configure</a:t>
+            </a:r>
+            <a:r>
+              <a:rPr lang="tr-TR" dirty="0"/>
+              <a:t> </a:t>
+            </a:r>
+            <a:r>
+              <a:rPr lang="tr-TR" dirty="0" err="1"/>
+              <a:t>the</a:t>
+            </a:r>
+            <a:r>
+              <a:rPr lang="tr-TR" dirty="0"/>
+              <a:t> </a:t>
+            </a:r>
+            <a:r>
+              <a:rPr lang="tr-TR" dirty="0" err="1"/>
+              <a:t>agent</a:t>
+            </a:r>
+            <a:r>
+              <a:rPr lang="tr-TR" dirty="0"/>
+              <a:t>. </a:t>
+            </a:r>
+            <a:r>
+              <a:rPr lang="tr-TR" dirty="0" err="1"/>
+              <a:t>Therefore</a:t>
+            </a:r>
+            <a:r>
+              <a:rPr lang="tr-TR" dirty="0"/>
+              <a:t>, </a:t>
+            </a:r>
+            <a:r>
+              <a:rPr lang="tr-TR" dirty="0" err="1"/>
+              <a:t>we</a:t>
+            </a:r>
+            <a:r>
+              <a:rPr lang="tr-TR" dirty="0"/>
+              <a:t> </a:t>
+            </a:r>
+            <a:r>
+              <a:rPr lang="tr-TR" dirty="0" err="1"/>
+              <a:t>will</a:t>
+            </a:r>
+            <a:r>
+              <a:rPr lang="tr-TR" dirty="0"/>
+              <a:t> </a:t>
+            </a:r>
+            <a:r>
+              <a:rPr lang="tr-TR" dirty="0" err="1"/>
+              <a:t>search</a:t>
+            </a:r>
+            <a:r>
+              <a:rPr lang="tr-TR" dirty="0"/>
+              <a:t> </a:t>
+            </a:r>
+            <a:r>
+              <a:rPr lang="tr-TR" dirty="0" err="1"/>
+              <a:t>this</a:t>
+            </a:r>
+            <a:r>
+              <a:rPr lang="tr-TR" dirty="0"/>
+              <a:t> </a:t>
+            </a:r>
+            <a:r>
+              <a:rPr lang="tr-TR" dirty="0" err="1"/>
+              <a:t>affects</a:t>
+            </a:r>
+            <a:r>
+              <a:rPr lang="tr-TR" dirty="0"/>
+              <a:t> </a:t>
+            </a:r>
+            <a:r>
+              <a:rPr lang="tr-TR" dirty="0" err="1"/>
+              <a:t>our</a:t>
+            </a:r>
+            <a:r>
+              <a:rPr lang="tr-TR" dirty="0"/>
+              <a:t> </a:t>
+            </a:r>
+            <a:r>
+              <a:rPr lang="tr-TR" dirty="0" err="1"/>
+              <a:t>agents</a:t>
+            </a:r>
+            <a:r>
+              <a:rPr lang="tr-TR" dirty="0"/>
+              <a:t>.</a:t>
+            </a:r>
+          </a:p>
+          <a:p>
+            <a:pPr marL="0" lvl="0" indent="0" algn="l" rtl="0">
+              <a:spcBef>
+                <a:spcPts val="0"/>
+              </a:spcBef>
+              <a:spcAft>
+                <a:spcPts val="0"/>
+              </a:spcAft>
+              <a:buNone/>
+            </a:pPr>
+            <a:r>
+              <a:rPr lang="tr-TR" dirty="0" err="1"/>
+              <a:t>Layer</a:t>
+            </a:r>
+            <a:r>
+              <a:rPr lang="tr-TR" dirty="0"/>
+              <a:t> </a:t>
+            </a:r>
+            <a:r>
+              <a:rPr lang="tr-TR" dirty="0" err="1"/>
+              <a:t>affect</a:t>
+            </a:r>
+            <a:r>
+              <a:rPr lang="tr-TR" dirty="0"/>
+              <a:t> </a:t>
+            </a:r>
+            <a:r>
+              <a:rPr lang="tr-TR" dirty="0" err="1"/>
+              <a:t>also</a:t>
+            </a:r>
+            <a:r>
+              <a:rPr lang="tr-TR" dirty="0"/>
+              <a:t>  </a:t>
+            </a:r>
+            <a:r>
+              <a:rPr lang="tr-TR" dirty="0" err="1"/>
+              <a:t>another</a:t>
+            </a:r>
+            <a:r>
+              <a:rPr lang="tr-TR" dirty="0"/>
+              <a:t> </a:t>
+            </a:r>
+            <a:r>
+              <a:rPr lang="tr-TR" dirty="0" err="1"/>
+              <a:t>parameter</a:t>
+            </a:r>
+            <a:r>
+              <a:rPr lang="tr-TR" dirty="0"/>
+              <a:t> </a:t>
+            </a:r>
+            <a:r>
+              <a:rPr lang="tr-TR" dirty="0" err="1"/>
+              <a:t>that</a:t>
+            </a:r>
+            <a:r>
+              <a:rPr lang="tr-TR" dirty="0"/>
+              <a:t> </a:t>
+            </a:r>
+            <a:r>
+              <a:rPr lang="tr-TR" dirty="0" err="1"/>
+              <a:t>affect</a:t>
+            </a:r>
+            <a:r>
+              <a:rPr lang="tr-TR" dirty="0"/>
+              <a:t> </a:t>
+            </a:r>
+            <a:r>
+              <a:rPr lang="tr-TR" dirty="0" err="1"/>
+              <a:t>the</a:t>
+            </a:r>
+            <a:r>
+              <a:rPr lang="tr-TR" dirty="0"/>
+              <a:t> </a:t>
+            </a:r>
+            <a:r>
+              <a:rPr lang="tr-TR" dirty="0" err="1"/>
+              <a:t>agent</a:t>
+            </a:r>
+            <a:r>
+              <a:rPr lang="tr-TR" dirty="0"/>
+              <a:t> </a:t>
+            </a:r>
+            <a:r>
+              <a:rPr lang="tr-TR" dirty="0" err="1"/>
+              <a:t>this</a:t>
+            </a:r>
+            <a:r>
+              <a:rPr lang="tr-TR" dirty="0"/>
+              <a:t> </a:t>
+            </a:r>
+            <a:r>
+              <a:rPr lang="tr-TR" dirty="0" err="1"/>
+              <a:t>will</a:t>
+            </a:r>
+            <a:r>
+              <a:rPr lang="tr-TR" dirty="0"/>
+              <a:t> be </a:t>
+            </a:r>
+            <a:r>
+              <a:rPr lang="tr-TR" dirty="0" err="1"/>
+              <a:t>searched</a:t>
+            </a:r>
+            <a:r>
+              <a:rPr lang="tr-TR" dirty="0"/>
+              <a:t>. </a:t>
+            </a:r>
+            <a:r>
+              <a:rPr lang="tr-TR" dirty="0" err="1"/>
+              <a:t>For</a:t>
+            </a:r>
+            <a:r>
+              <a:rPr lang="tr-TR" dirty="0"/>
+              <a:t> </a:t>
+            </a:r>
+            <a:r>
+              <a:rPr lang="tr-TR" dirty="0" err="1"/>
+              <a:t>this</a:t>
+            </a:r>
+            <a:r>
+              <a:rPr lang="tr-TR" dirty="0"/>
+              <a:t> </a:t>
+            </a:r>
+            <a:r>
+              <a:rPr lang="tr-TR" dirty="0" err="1"/>
+              <a:t>now</a:t>
+            </a:r>
+            <a:r>
+              <a:rPr lang="tr-TR" dirty="0"/>
+              <a:t> </a:t>
+            </a:r>
+            <a:r>
+              <a:rPr lang="tr-TR" dirty="0" err="1"/>
+              <a:t>we</a:t>
+            </a:r>
+            <a:r>
+              <a:rPr lang="tr-TR" dirty="0"/>
+              <a:t> </a:t>
+            </a:r>
+            <a:r>
+              <a:rPr lang="tr-TR" dirty="0" err="1"/>
+              <a:t>are</a:t>
+            </a:r>
+            <a:r>
+              <a:rPr lang="tr-TR" dirty="0"/>
+              <a:t> </a:t>
+            </a:r>
+            <a:r>
+              <a:rPr lang="tr-TR" dirty="0" err="1"/>
+              <a:t>using</a:t>
+            </a:r>
+            <a:r>
+              <a:rPr lang="tr-TR" dirty="0"/>
+              <a:t> 128? </a:t>
+            </a:r>
+            <a:r>
+              <a:rPr lang="tr-TR" dirty="0" err="1"/>
+              <a:t>layer</a:t>
+            </a:r>
+            <a:r>
+              <a:rPr lang="tr-TR" dirty="0"/>
+              <a:t>.</a:t>
+            </a:r>
+          </a:p>
+          <a:p>
+            <a:pPr marL="0" lvl="0" indent="0" algn="l" rtl="0">
+              <a:spcBef>
+                <a:spcPts val="0"/>
+              </a:spcBef>
+              <a:spcAft>
+                <a:spcPts val="0"/>
+              </a:spcAft>
+              <a:buNone/>
+            </a:pPr>
+            <a:endParaRPr lang="tr-TR" dirty="0"/>
           </a:p>
         </p:txBody>
       </p:sp>
@@ -10964,13 +14058,10 @@
               <a:buNone/>
             </a:pPr>
             <a:r>
-              <a:rPr lang="tr-TR" dirty="0"/>
-              <a:t>Project </a:t>
-            </a:r>
-            <a:r>
-              <a:rPr lang="en-US" dirty="0"/>
-              <a:t>Description</a:t>
-            </a:r>
+              <a:rPr lang="tr-TR" dirty="0" err="1"/>
+              <a:t>Introduction</a:t>
+            </a:r>
+            <a:endParaRPr lang="en-US" dirty="0"/>
           </a:p>
         </p:txBody>
       </p:sp>
@@ -12897,8 +15988,8 @@
           </a:fontRef>
         </p:style>
       </p:cxnSp>
-      <mc:AlternateContent xmlns:mc="http://schemas.openxmlformats.org/markup-compatibility/2006">
-        <mc:Choice xmlns:a14="http://schemas.microsoft.com/office/drawing/2010/main" Requires="a14">
+      <mc:AlternateContent xmlns:mc="http://schemas.openxmlformats.org/markup-compatibility/2006" xmlns:a14="http://schemas.microsoft.com/office/drawing/2010/main">
+        <mc:Choice Requires="a14">
           <p:sp>
             <p:nvSpPr>
               <p:cNvPr id="19" name="TextBox 18">
@@ -13084,7 +16175,7 @@
             </p:txBody>
           </p:sp>
         </mc:Choice>
-        <mc:Fallback>
+        <mc:Fallback xmlns="">
           <p:sp>
             <p:nvSpPr>
               <p:cNvPr id="19" name="TextBox 18">

</xml_diff>